<commit_message>
add credits to composite
and delete archive and scripts
</commit_message>
<xml_diff>
--- a/Day1/HMM_Tutorial_Day1.pptx
+++ b/Day1/HMM_Tutorial_Day1.pptx
@@ -7,14 +7,19 @@
   <p:sldIdLst>
     <p:sldId id="257" r:id="rId2"/>
     <p:sldId id="259" r:id="rId3"/>
-    <p:sldId id="263" r:id="rId4"/>
-    <p:sldId id="264" r:id="rId5"/>
-    <p:sldId id="262" r:id="rId6"/>
-    <p:sldId id="265" r:id="rId7"/>
+    <p:sldId id="270" r:id="rId4"/>
+    <p:sldId id="263" r:id="rId5"/>
+    <p:sldId id="271" r:id="rId6"/>
+    <p:sldId id="262" r:id="rId7"/>
     <p:sldId id="266" r:id="rId8"/>
-    <p:sldId id="267" r:id="rId9"/>
-    <p:sldId id="268" r:id="rId10"/>
-    <p:sldId id="269" r:id="rId11"/>
+    <p:sldId id="265" r:id="rId9"/>
+    <p:sldId id="272" r:id="rId10"/>
+    <p:sldId id="268" r:id="rId11"/>
+    <p:sldId id="273" r:id="rId12"/>
+    <p:sldId id="269" r:id="rId13"/>
+    <p:sldId id="276" r:id="rId14"/>
+    <p:sldId id="277" r:id="rId15"/>
+    <p:sldId id="278" r:id="rId16"/>
   </p:sldIdLst>
   <p:sldSz cx="12192000" cy="6858000"/>
   <p:notesSz cx="6858000" cy="9144000"/>
@@ -113,6 +118,11 @@
       </a:defRPr>
     </a:lvl9pPr>
   </p:defaultTextStyle>
+  <p:extLst>
+    <p:ext uri="{EFAFB233-063F-42B5-8137-9DF3F51BA10A}">
+      <p15:sldGuideLst xmlns:p15="http://schemas.microsoft.com/office/powerpoint/2012/main"/>
+    </p:ext>
+  </p:extLst>
 </p:presentation>
 </file>
 
@@ -4053,7 +4063,7 @@
           <p:cNvPr id="2" name="Content Placeholder 1">
             <a:extLst>
               <a:ext uri="{FF2B5EF4-FFF2-40B4-BE49-F238E27FC236}">
-                <a16:creationId xmlns:a16="http://schemas.microsoft.com/office/drawing/2014/main" id="{A7CBE74B-2EED-44E3-A630-FAB07C1CB2BA}"/>
+                <a16:creationId xmlns:a16="http://schemas.microsoft.com/office/drawing/2014/main" id="{8158A7E8-673A-4442-950A-3B7B01FD0ADF}"/>
               </a:ext>
             </a:extLst>
           </p:cNvPr>
@@ -4066,10 +4076,295 @@
         </p:nvSpPr>
         <p:spPr/>
         <p:txBody>
-          <a:bodyPr/>
+          <a:bodyPr>
+            <a:normAutofit/>
+          </a:bodyPr>
           <a:lstStyle/>
           <a:p>
-            <a:endParaRPr lang="en-US"/>
+            <a:pPr marL="0" indent="0">
+              <a:buNone/>
+            </a:pPr>
+            <a:r>
+              <a:rPr lang="en-CA" dirty="0"/>
+              <a:t>Minimum arguments:</a:t>
+            </a:r>
+            <a:endParaRPr lang="en-US" dirty="0"/>
+          </a:p>
+          <a:p>
+            <a:r>
+              <a:rPr lang="en-US" sz="2400" spc="-107" dirty="0" err="1">
+                <a:solidFill>
+                  <a:schemeClr val="bg2">
+                    <a:lumMod val="10000"/>
+                  </a:schemeClr>
+                </a:solidFill>
+                <a:latin typeface="Lucida Console" panose="020B0609040504020204" pitchFamily="49" charset="0"/>
+                <a:cs typeface="Courier New" panose="02070309020205020404" pitchFamily="49" charset="0"/>
+              </a:rPr>
+              <a:t>nbState</a:t>
+            </a:r>
+            <a:r>
+              <a:rPr lang="en-US" dirty="0"/>
+              <a:t> – number of </a:t>
+            </a:r>
+            <a:r>
+              <a:rPr lang="en-US" dirty="0" err="1"/>
+              <a:t>behavioural</a:t>
+            </a:r>
+            <a:r>
+              <a:rPr lang="en-US" dirty="0"/>
+              <a:t> states</a:t>
+            </a:r>
+          </a:p>
+          <a:p>
+            <a:r>
+              <a:rPr lang="en-US" sz="2400" spc="-107" dirty="0" err="1">
+                <a:solidFill>
+                  <a:schemeClr val="bg2">
+                    <a:lumMod val="10000"/>
+                  </a:schemeClr>
+                </a:solidFill>
+                <a:latin typeface="Lucida Console" panose="020B0609040504020204" pitchFamily="49" charset="0"/>
+                <a:cs typeface="Courier New" panose="02070309020205020404" pitchFamily="49" charset="0"/>
+              </a:rPr>
+              <a:t>Dist</a:t>
+            </a:r>
+            <a:r>
+              <a:rPr lang="en-US" dirty="0"/>
+              <a:t> – named </a:t>
+            </a:r>
+            <a:r>
+              <a:rPr lang="en-CA" dirty="0"/>
+              <a:t>list </a:t>
+            </a:r>
+            <a:r>
+              <a:rPr lang="en-US" dirty="0"/>
+              <a:t>distribution associated with each data stream</a:t>
+            </a:r>
+          </a:p>
+          <a:p>
+            <a:pPr lvl="1"/>
+            <a:r>
+              <a:rPr lang="en-CA" dirty="0"/>
+              <a:t>E</a:t>
+            </a:r>
+            <a:r>
+              <a:rPr lang="en-US" dirty="0"/>
+              <a:t>.g., gamma for step length and von Mises for turning angle</a:t>
+            </a:r>
+          </a:p>
+          <a:p>
+            <a:pPr lvl="1"/>
+            <a:r>
+              <a:rPr lang="en-CA" dirty="0"/>
+              <a:t>E.</a:t>
+            </a:r>
+            <a:r>
+              <a:rPr lang="en-US" dirty="0"/>
+              <a:t>g., </a:t>
+            </a:r>
+            <a:r>
+              <a:rPr lang="en-US" dirty="0" err="1">
+                <a:solidFill>
+                  <a:schemeClr val="bg2">
+                    <a:lumMod val="10000"/>
+                  </a:schemeClr>
+                </a:solidFill>
+                <a:latin typeface="Lucida Console" panose="020B0609040504020204" pitchFamily="49" charset="0"/>
+                <a:cs typeface="Courier New" panose="02070309020205020404" pitchFamily="49" charset="0"/>
+              </a:rPr>
+              <a:t>dist</a:t>
+            </a:r>
+            <a:r>
+              <a:rPr lang="en-US" dirty="0">
+                <a:solidFill>
+                  <a:schemeClr val="bg2">
+                    <a:lumMod val="10000"/>
+                  </a:schemeClr>
+                </a:solidFill>
+                <a:latin typeface="Lucida Console" panose="020B0609040504020204" pitchFamily="49" charset="0"/>
+                <a:cs typeface="Courier New" panose="02070309020205020404" pitchFamily="49" charset="0"/>
+              </a:rPr>
+              <a:t>=list(step="gamma", angle="</a:t>
+            </a:r>
+            <a:r>
+              <a:rPr lang="en-US" dirty="0" err="1">
+                <a:solidFill>
+                  <a:schemeClr val="bg2">
+                    <a:lumMod val="10000"/>
+                  </a:schemeClr>
+                </a:solidFill>
+                <a:latin typeface="Lucida Console" panose="020B0609040504020204" pitchFamily="49" charset="0"/>
+                <a:cs typeface="Courier New" panose="02070309020205020404" pitchFamily="49" charset="0"/>
+              </a:rPr>
+              <a:t>vm</a:t>
+            </a:r>
+            <a:r>
+              <a:rPr lang="en-US" dirty="0">
+                <a:solidFill>
+                  <a:schemeClr val="bg2">
+                    <a:lumMod val="10000"/>
+                  </a:schemeClr>
+                </a:solidFill>
+                <a:latin typeface="Lucida Console" panose="020B0609040504020204" pitchFamily="49" charset="0"/>
+                <a:cs typeface="Courier New" panose="02070309020205020404" pitchFamily="49" charset="0"/>
+              </a:rPr>
+              <a:t>")</a:t>
+            </a:r>
+          </a:p>
+          <a:p>
+            <a:r>
+              <a:rPr lang="en-CA" sz="2400" spc="-107" dirty="0">
+                <a:solidFill>
+                  <a:schemeClr val="bg2">
+                    <a:lumMod val="10000"/>
+                  </a:schemeClr>
+                </a:solidFill>
+                <a:latin typeface="Lucida Console" panose="020B0609040504020204" pitchFamily="49" charset="0"/>
+                <a:cs typeface="Courier New" panose="02070309020205020404" pitchFamily="49" charset="0"/>
+              </a:rPr>
+              <a:t>Par0</a:t>
+            </a:r>
+            <a:r>
+              <a:rPr lang="en-US" dirty="0"/>
+              <a:t> – </a:t>
+            </a:r>
+            <a:r>
+              <a:rPr lang="en-CA" dirty="0"/>
+              <a:t>named list initial parameters for data optimisation</a:t>
+            </a:r>
+          </a:p>
+          <a:p>
+            <a:pPr lvl="1"/>
+            <a:r>
+              <a:rPr lang="en-CA" dirty="0"/>
+              <a:t>E.g., step length </a:t>
+            </a:r>
+            <a:r>
+              <a:rPr lang="en-CA" i="1" dirty="0">
+                <a:latin typeface="Latin Modern Math" panose="02000503000000000000" pitchFamily="50" charset="0"/>
+                <a:ea typeface="Latin Modern Math" panose="02000503000000000000" pitchFamily="50" charset="0"/>
+              </a:rPr>
+              <a:t>l </a:t>
+            </a:r>
+            <a:r>
+              <a:rPr lang="en-CA" dirty="0"/>
+              <a:t>~ </a:t>
+            </a:r>
+            <a:r>
+              <a:rPr lang="en-CA" dirty="0">
+                <a:latin typeface="CMU Bright" panose="02000603000000000000" pitchFamily="2" charset="0"/>
+                <a:ea typeface="CMU Bright" panose="02000603000000000000" pitchFamily="2" charset="0"/>
+                <a:cs typeface="CMU Bright" panose="02000603000000000000" pitchFamily="2" charset="0"/>
+              </a:rPr>
+              <a:t>gamma(</a:t>
+            </a:r>
+            <a:r>
+              <a:rPr lang="el-GR" i="1" dirty="0">
+                <a:latin typeface="Latin Modern Math" panose="02000503000000000000" pitchFamily="50" charset="0"/>
+                <a:ea typeface="Latin Modern Math" panose="02000503000000000000" pitchFamily="50" charset="0"/>
+                <a:cs typeface="CMU Bright" panose="02000603000000000000" pitchFamily="2" charset="0"/>
+              </a:rPr>
+              <a:t>μ</a:t>
+            </a:r>
+            <a:r>
+              <a:rPr lang="en-CA" i="1" baseline="-25000" dirty="0" err="1">
+                <a:latin typeface="Latin Modern Math" panose="02000503000000000000" pitchFamily="50" charset="0"/>
+                <a:ea typeface="Latin Modern Math" panose="02000503000000000000" pitchFamily="50" charset="0"/>
+                <a:cs typeface="CMU Bright" panose="02000603000000000000" pitchFamily="2" charset="0"/>
+              </a:rPr>
+              <a:t>i</a:t>
+            </a:r>
+            <a:r>
+              <a:rPr lang="en-CA" i="1" dirty="0">
+                <a:latin typeface="Latin Modern Math" panose="02000503000000000000" pitchFamily="50" charset="0"/>
+                <a:ea typeface="Latin Modern Math" panose="02000503000000000000" pitchFamily="50" charset="0"/>
+                <a:cs typeface="CMU Bright" panose="02000603000000000000" pitchFamily="2" charset="0"/>
+              </a:rPr>
+              <a:t>,</a:t>
+            </a:r>
+            <a:r>
+              <a:rPr lang="el-GR" i="1" dirty="0">
+                <a:latin typeface="Latin Modern Math" panose="02000503000000000000" pitchFamily="50" charset="0"/>
+                <a:ea typeface="Latin Modern Math" panose="02000503000000000000" pitchFamily="50" charset="0"/>
+                <a:cs typeface="CMU Bright" panose="02000603000000000000" pitchFamily="2" charset="0"/>
+              </a:rPr>
+              <a:t>σ</a:t>
+            </a:r>
+            <a:r>
+              <a:rPr lang="en-CA" i="1" baseline="-25000" dirty="0" err="1">
+                <a:latin typeface="Latin Modern Math" panose="02000503000000000000" pitchFamily="50" charset="0"/>
+                <a:ea typeface="Latin Modern Math" panose="02000503000000000000" pitchFamily="50" charset="0"/>
+                <a:cs typeface="CMU Bright" panose="02000603000000000000" pitchFamily="2" charset="0"/>
+              </a:rPr>
+              <a:t>i</a:t>
+            </a:r>
+            <a:r>
+              <a:rPr lang="en-CA" dirty="0">
+                <a:latin typeface="CMU Bright" panose="02000603000000000000" pitchFamily="2" charset="0"/>
+                <a:ea typeface="CMU Bright" panose="02000603000000000000" pitchFamily="2" charset="0"/>
+                <a:cs typeface="CMU Bright" panose="02000603000000000000" pitchFamily="2" charset="0"/>
+              </a:rPr>
+              <a:t>)</a:t>
+            </a:r>
+            <a:r>
+              <a:rPr lang="en-CA" dirty="0"/>
+              <a:t>, define </a:t>
+            </a:r>
+            <a:r>
+              <a:rPr lang="el-GR" i="1" dirty="0">
+                <a:latin typeface="Latin Modern Math" panose="02000503000000000000" pitchFamily="50" charset="0"/>
+                <a:ea typeface="Latin Modern Math" panose="02000503000000000000" pitchFamily="50" charset="0"/>
+                <a:cs typeface="CMU Bright" panose="02000603000000000000" pitchFamily="2" charset="0"/>
+              </a:rPr>
+              <a:t>μ</a:t>
+            </a:r>
+            <a:r>
+              <a:rPr lang="en-CA" dirty="0"/>
+              <a:t> and </a:t>
+            </a:r>
+            <a:r>
+              <a:rPr lang="el-GR" i="1" dirty="0">
+                <a:latin typeface="Latin Modern Math" panose="02000503000000000000" pitchFamily="50" charset="0"/>
+                <a:ea typeface="Latin Modern Math" panose="02000503000000000000" pitchFamily="50" charset="0"/>
+                <a:cs typeface="CMU Bright" panose="02000603000000000000" pitchFamily="2" charset="0"/>
+              </a:rPr>
+              <a:t>σ</a:t>
+            </a:r>
+            <a:r>
+              <a:rPr lang="en-CA" dirty="0"/>
+              <a:t> for each state</a:t>
+            </a:r>
+          </a:p>
+          <a:p>
+            <a:pPr lvl="1"/>
+            <a:r>
+              <a:rPr lang="en-CA" sz="2000" dirty="0">
+                <a:solidFill>
+                  <a:schemeClr val="bg2">
+                    <a:lumMod val="10000"/>
+                  </a:schemeClr>
+                </a:solidFill>
+                <a:latin typeface="Lucida Console" panose="020B0609040504020204" pitchFamily="49" charset="0"/>
+                <a:cs typeface="Courier New" panose="02070309020205020404" pitchFamily="49" charset="0"/>
+              </a:rPr>
+              <a:t>Par0 = list(step=c(mu0, sigma0), angle=kappa0)</a:t>
+            </a:r>
+          </a:p>
+          <a:p>
+            <a:pPr lvl="1"/>
+            <a:r>
+              <a:rPr lang="en-CA" sz="2000" dirty="0">
+                <a:solidFill>
+                  <a:schemeClr val="bg2">
+                    <a:lumMod val="10000"/>
+                  </a:schemeClr>
+                </a:solidFill>
+                <a:latin typeface="Lucida Console" panose="020B0609040504020204" pitchFamily="49" charset="0"/>
+                <a:cs typeface="Courier New" panose="02070309020205020404" pitchFamily="49" charset="0"/>
+              </a:rPr>
+              <a:t>Par0 = list(step=c(c(200,500), c(100,250)), angle=c(0.5,0.8))</a:t>
+            </a:r>
           </a:p>
         </p:txBody>
       </p:sp>
@@ -4078,7 +4373,7 @@
           <p:cNvPr id="3" name="Slide Number Placeholder 2">
             <a:extLst>
               <a:ext uri="{FF2B5EF4-FFF2-40B4-BE49-F238E27FC236}">
-                <a16:creationId xmlns:a16="http://schemas.microsoft.com/office/drawing/2014/main" id="{4246CD2A-F44A-45BF-A7E7-99E5AB9C0997}"/>
+                <a16:creationId xmlns:a16="http://schemas.microsoft.com/office/drawing/2014/main" id="{4CB58DD9-7462-4F66-B011-DAC7CF9A358D}"/>
               </a:ext>
             </a:extLst>
           </p:cNvPr>
@@ -4108,7 +4403,7 @@
           <p:cNvPr id="4" name="Title 3">
             <a:extLst>
               <a:ext uri="{FF2B5EF4-FFF2-40B4-BE49-F238E27FC236}">
-                <a16:creationId xmlns:a16="http://schemas.microsoft.com/office/drawing/2014/main" id="{923D21AF-BBFC-4231-AEC1-2FD89EED9E27}"/>
+                <a16:creationId xmlns:a16="http://schemas.microsoft.com/office/drawing/2014/main" id="{D59B0DCA-D1B0-4D44-8C96-53954CF5FE58}"/>
               </a:ext>
             </a:extLst>
           </p:cNvPr>
@@ -4124,7 +4419,574 @@
           <a:bodyPr/>
           <a:lstStyle/>
           <a:p>
-            <a:endParaRPr lang="en-US"/>
+            <a:r>
+              <a:rPr lang="en-US" dirty="0" err="1">
+                <a:latin typeface="Lucida Console" panose="020B0609040504020204" pitchFamily="49" charset="0"/>
+              </a:rPr>
+              <a:t>fitHMM</a:t>
+            </a:r>
+            <a:r>
+              <a:rPr lang="en-US" dirty="0">
+                <a:latin typeface="Lucida Console" panose="020B0609040504020204" pitchFamily="49" charset="0"/>
+              </a:rPr>
+              <a:t>(data, …)</a:t>
+            </a:r>
+          </a:p>
+        </p:txBody>
+      </p:sp>
+    </p:spTree>
+    <p:extLst>
+      <p:ext uri="{BB962C8B-B14F-4D97-AF65-F5344CB8AC3E}">
+        <p14:creationId xmlns:p14="http://schemas.microsoft.com/office/powerpoint/2010/main" val="2920903825"/>
+      </p:ext>
+    </p:extLst>
+  </p:cSld>
+  <p:clrMapOvr>
+    <a:masterClrMapping/>
+  </p:clrMapOvr>
+</p:sld>
+</file>
+
+<file path=ppt/slides/slide11.xml><?xml version="1.0" encoding="utf-8"?>
+<p:sld xmlns:a="http://schemas.openxmlformats.org/drawingml/2006/main" xmlns:r="http://schemas.openxmlformats.org/officeDocument/2006/relationships" xmlns:p="http://schemas.openxmlformats.org/presentationml/2006/main">
+  <p:cSld>
+    <p:spTree>
+      <p:nvGrpSpPr>
+        <p:cNvPr id="1" name=""/>
+        <p:cNvGrpSpPr/>
+        <p:nvPr/>
+      </p:nvGrpSpPr>
+      <p:grpSpPr>
+        <a:xfrm>
+          <a:off x="0" y="0"/>
+          <a:ext cx="0" cy="0"/>
+          <a:chOff x="0" y="0"/>
+          <a:chExt cx="0" cy="0"/>
+        </a:xfrm>
+      </p:grpSpPr>
+      <p:sp>
+        <p:nvSpPr>
+          <p:cNvPr id="2" name="Content Placeholder 1">
+            <a:extLst>
+              <a:ext uri="{FF2B5EF4-FFF2-40B4-BE49-F238E27FC236}">
+                <a16:creationId xmlns:a16="http://schemas.microsoft.com/office/drawing/2014/main" id="{8158A7E8-673A-4442-950A-3B7B01FD0ADF}"/>
+              </a:ext>
+            </a:extLst>
+          </p:cNvPr>
+          <p:cNvSpPr>
+            <a:spLocks noGrp="1"/>
+          </p:cNvSpPr>
+          <p:nvPr>
+            <p:ph idx="1"/>
+          </p:nvPr>
+        </p:nvSpPr>
+        <p:spPr/>
+        <p:txBody>
+          <a:bodyPr>
+            <a:normAutofit fontScale="92500" lnSpcReduction="10000"/>
+          </a:bodyPr>
+          <a:lstStyle/>
+          <a:p>
+            <a:pPr marL="0" indent="0">
+              <a:buNone/>
+            </a:pPr>
+            <a:r>
+              <a:rPr lang="en-CA" dirty="0"/>
+              <a:t>Optional arguments:</a:t>
+            </a:r>
+          </a:p>
+          <a:p>
+            <a:r>
+              <a:rPr lang="en-CA" sz="2400" spc="-107" dirty="0">
+                <a:solidFill>
+                  <a:schemeClr val="bg2">
+                    <a:lumMod val="10000"/>
+                  </a:schemeClr>
+                </a:solidFill>
+                <a:latin typeface="Lucida Console" panose="020B0609040504020204" pitchFamily="49" charset="0"/>
+                <a:cs typeface="Courier New" panose="02070309020205020404" pitchFamily="49" charset="0"/>
+              </a:rPr>
+              <a:t>Formula</a:t>
+            </a:r>
+            <a:r>
+              <a:rPr lang="en-US" dirty="0"/>
+              <a:t> – </a:t>
+            </a:r>
+            <a:r>
+              <a:rPr lang="en-CA" dirty="0"/>
+              <a:t>effects of covariates on the transition probability</a:t>
+            </a:r>
+          </a:p>
+          <a:p>
+            <a:pPr lvl="1"/>
+            <a:r>
+              <a:rPr lang="en-CA" dirty="0"/>
+              <a:t>E.g., </a:t>
+            </a:r>
+            <a:r>
+              <a:rPr lang="en-CA" dirty="0">
+                <a:solidFill>
+                  <a:schemeClr val="bg2">
+                    <a:lumMod val="10000"/>
+                  </a:schemeClr>
+                </a:solidFill>
+                <a:latin typeface="Lucida Console" panose="020B0609040504020204" pitchFamily="49" charset="0"/>
+                <a:cs typeface="Courier New" panose="02070309020205020404" pitchFamily="49" charset="0"/>
+              </a:rPr>
+              <a:t>formula= ~bathy</a:t>
+            </a:r>
+          </a:p>
+          <a:p>
+            <a:r>
+              <a:rPr lang="en-CA" dirty="0" err="1">
+                <a:solidFill>
+                  <a:schemeClr val="bg2">
+                    <a:lumMod val="10000"/>
+                  </a:schemeClr>
+                </a:solidFill>
+                <a:latin typeface="Lucida Console" panose="020B0609040504020204" pitchFamily="49" charset="0"/>
+                <a:cs typeface="Courier New" panose="02070309020205020404" pitchFamily="49" charset="0"/>
+              </a:rPr>
+              <a:t>estAngleMean</a:t>
+            </a:r>
+            <a:r>
+              <a:rPr lang="en-US" dirty="0"/>
+              <a:t> – </a:t>
+            </a:r>
+            <a:r>
+              <a:rPr lang="en-CA" dirty="0"/>
+              <a:t>Whether to estimate mean turning angle (default=F)</a:t>
+            </a:r>
+          </a:p>
+          <a:p>
+            <a:r>
+              <a:rPr lang="en-CA" dirty="0" err="1">
+                <a:solidFill>
+                  <a:schemeClr val="bg2">
+                    <a:lumMod val="10000"/>
+                  </a:schemeClr>
+                </a:solidFill>
+                <a:latin typeface="Lucida Console" panose="020B0609040504020204" pitchFamily="49" charset="0"/>
+                <a:cs typeface="Courier New" panose="02070309020205020404" pitchFamily="49" charset="0"/>
+              </a:rPr>
+              <a:t>circularAngleMean</a:t>
+            </a:r>
+            <a:r>
+              <a:rPr lang="en-CA" dirty="0"/>
+              <a:t> </a:t>
+            </a:r>
+            <a:r>
+              <a:rPr lang="en-US" dirty="0"/>
+              <a:t>– </a:t>
+            </a:r>
+            <a:r>
+              <a:rPr lang="en-CA" dirty="0"/>
+              <a:t>Whether to use a circular-circular distribution for turn angle (use if examining bias relative to multiple factors or if expect non-linear relationship; default = circular-linear)</a:t>
+            </a:r>
+          </a:p>
+          <a:p>
+            <a:r>
+              <a:rPr lang="en-CA" dirty="0" err="1">
+                <a:solidFill>
+                  <a:schemeClr val="bg2">
+                    <a:lumMod val="10000"/>
+                  </a:schemeClr>
+                </a:solidFill>
+                <a:latin typeface="Lucida Console" panose="020B0609040504020204" pitchFamily="49" charset="0"/>
+                <a:cs typeface="Courier New" panose="02070309020205020404" pitchFamily="49" charset="0"/>
+              </a:rPr>
+              <a:t>stateNames</a:t>
+            </a:r>
+            <a:r>
+              <a:rPr lang="en-CA" dirty="0"/>
+              <a:t> </a:t>
+            </a:r>
+            <a:r>
+              <a:rPr lang="en-US" dirty="0"/>
+              <a:t>– names associated with each </a:t>
+            </a:r>
+            <a:r>
+              <a:rPr lang="en-US" dirty="0" err="1"/>
+              <a:t>behavioural</a:t>
+            </a:r>
+            <a:r>
+              <a:rPr lang="en-US" dirty="0"/>
+              <a:t> state</a:t>
+            </a:r>
+          </a:p>
+          <a:p>
+            <a:r>
+              <a:rPr lang="en-CA" dirty="0" err="1">
+                <a:solidFill>
+                  <a:schemeClr val="bg2">
+                    <a:lumMod val="10000"/>
+                  </a:schemeClr>
+                </a:solidFill>
+                <a:latin typeface="Lucida Console" panose="020B0609040504020204" pitchFamily="49" charset="0"/>
+                <a:cs typeface="Courier New" panose="02070309020205020404" pitchFamily="49" charset="0"/>
+              </a:rPr>
+              <a:t>retryFits</a:t>
+            </a:r>
+            <a:r>
+              <a:rPr lang="en-CA" dirty="0"/>
+              <a:t> </a:t>
+            </a:r>
+            <a:r>
+              <a:rPr lang="en-US" dirty="0"/>
+              <a:t>–  number of times to attempt to fit the model </a:t>
+            </a:r>
+            <a:endParaRPr lang="en-CA" dirty="0">
+              <a:solidFill>
+                <a:schemeClr val="bg2">
+                  <a:lumMod val="10000"/>
+                </a:schemeClr>
+              </a:solidFill>
+              <a:latin typeface="Lucida Console" panose="020B0609040504020204" pitchFamily="49" charset="0"/>
+              <a:cs typeface="Courier New" panose="02070309020205020404" pitchFamily="49" charset="0"/>
+            </a:endParaRPr>
+          </a:p>
+          <a:p>
+            <a:r>
+              <a:rPr lang="en-CA" dirty="0">
+                <a:solidFill>
+                  <a:schemeClr val="bg2">
+                    <a:lumMod val="10000"/>
+                  </a:schemeClr>
+                </a:solidFill>
+                <a:latin typeface="Lucida Console" panose="020B0609040504020204" pitchFamily="49" charset="0"/>
+                <a:cs typeface="Courier New" panose="02070309020205020404" pitchFamily="49" charset="0"/>
+              </a:rPr>
+              <a:t>DM</a:t>
+            </a:r>
+            <a:r>
+              <a:rPr lang="en-US" dirty="0"/>
+              <a:t>, </a:t>
+            </a:r>
+            <a:r>
+              <a:rPr lang="en-CA" dirty="0" err="1">
+                <a:solidFill>
+                  <a:schemeClr val="bg2">
+                    <a:lumMod val="10000"/>
+                  </a:schemeClr>
+                </a:solidFill>
+                <a:latin typeface="Lucida Console" panose="020B0609040504020204" pitchFamily="49" charset="0"/>
+                <a:cs typeface="Courier New" panose="02070309020205020404" pitchFamily="49" charset="0"/>
+              </a:rPr>
+              <a:t>workBounds</a:t>
+            </a:r>
+            <a:r>
+              <a:rPr lang="en-US" dirty="0"/>
+              <a:t>, </a:t>
+            </a:r>
+            <a:r>
+              <a:rPr lang="en-CA" dirty="0" err="1">
+                <a:solidFill>
+                  <a:schemeClr val="bg2">
+                    <a:lumMod val="10000"/>
+                  </a:schemeClr>
+                </a:solidFill>
+                <a:latin typeface="Lucida Console" panose="020B0609040504020204" pitchFamily="49" charset="0"/>
+                <a:cs typeface="Courier New" panose="02070309020205020404" pitchFamily="49" charset="0"/>
+              </a:rPr>
+              <a:t>betaCons</a:t>
+            </a:r>
+            <a:r>
+              <a:rPr lang="en-US" dirty="0"/>
+              <a:t>, </a:t>
+            </a:r>
+            <a:r>
+              <a:rPr lang="en-CA" dirty="0" err="1">
+                <a:solidFill>
+                  <a:schemeClr val="bg2">
+                    <a:lumMod val="10000"/>
+                  </a:schemeClr>
+                </a:solidFill>
+                <a:latin typeface="Lucida Console" panose="020B0609040504020204" pitchFamily="49" charset="0"/>
+                <a:cs typeface="Courier New" panose="02070309020205020404" pitchFamily="49" charset="0"/>
+              </a:rPr>
+              <a:t>fixPar</a:t>
+            </a:r>
+            <a:r>
+              <a:rPr lang="en-US" dirty="0"/>
+              <a:t>, …</a:t>
+            </a:r>
+            <a:endParaRPr lang="en-CA" dirty="0">
+              <a:solidFill>
+                <a:schemeClr val="bg2">
+                  <a:lumMod val="10000"/>
+                </a:schemeClr>
+              </a:solidFill>
+              <a:latin typeface="Lucida Console" panose="020B0609040504020204" pitchFamily="49" charset="0"/>
+              <a:cs typeface="Courier New" panose="02070309020205020404" pitchFamily="49" charset="0"/>
+            </a:endParaRPr>
+          </a:p>
+        </p:txBody>
+      </p:sp>
+      <p:sp>
+        <p:nvSpPr>
+          <p:cNvPr id="3" name="Slide Number Placeholder 2">
+            <a:extLst>
+              <a:ext uri="{FF2B5EF4-FFF2-40B4-BE49-F238E27FC236}">
+                <a16:creationId xmlns:a16="http://schemas.microsoft.com/office/drawing/2014/main" id="{4CB58DD9-7462-4F66-B011-DAC7CF9A358D}"/>
+              </a:ext>
+            </a:extLst>
+          </p:cNvPr>
+          <p:cNvSpPr>
+            <a:spLocks noGrp="1"/>
+          </p:cNvSpPr>
+          <p:nvPr>
+            <p:ph type="sldNum" sz="quarter" idx="12"/>
+          </p:nvPr>
+        </p:nvSpPr>
+        <p:spPr/>
+        <p:txBody>
+          <a:bodyPr/>
+          <a:lstStyle/>
+          <a:p>
+            <a:fld id="{E50A8D5F-7A10-4D19-B2BD-04FE5CA3B31F}" type="slidenum">
+              <a:rPr lang="en-US" smtClean="0"/>
+              <a:pPr/>
+              <a:t>11</a:t>
+            </a:fld>
+            <a:endParaRPr lang="en-US" dirty="0"/>
+          </a:p>
+        </p:txBody>
+      </p:sp>
+      <p:sp>
+        <p:nvSpPr>
+          <p:cNvPr id="4" name="Title 3">
+            <a:extLst>
+              <a:ext uri="{FF2B5EF4-FFF2-40B4-BE49-F238E27FC236}">
+                <a16:creationId xmlns:a16="http://schemas.microsoft.com/office/drawing/2014/main" id="{D59B0DCA-D1B0-4D44-8C96-53954CF5FE58}"/>
+              </a:ext>
+            </a:extLst>
+          </p:cNvPr>
+          <p:cNvSpPr>
+            <a:spLocks noGrp="1"/>
+          </p:cNvSpPr>
+          <p:nvPr>
+            <p:ph type="title"/>
+          </p:nvPr>
+        </p:nvSpPr>
+        <p:spPr/>
+        <p:txBody>
+          <a:bodyPr/>
+          <a:lstStyle/>
+          <a:p>
+            <a:r>
+              <a:rPr lang="en-US" dirty="0" err="1">
+                <a:latin typeface="Lucida Console" panose="020B0609040504020204" pitchFamily="49" charset="0"/>
+              </a:rPr>
+              <a:t>fitHMM</a:t>
+            </a:r>
+            <a:r>
+              <a:rPr lang="en-US" dirty="0">
+                <a:latin typeface="Lucida Console" panose="020B0609040504020204" pitchFamily="49" charset="0"/>
+              </a:rPr>
+              <a:t>(data, …)</a:t>
+            </a:r>
+          </a:p>
+        </p:txBody>
+      </p:sp>
+    </p:spTree>
+    <p:extLst>
+      <p:ext uri="{BB962C8B-B14F-4D97-AF65-F5344CB8AC3E}">
+        <p14:creationId xmlns:p14="http://schemas.microsoft.com/office/powerpoint/2010/main" val="1156427404"/>
+      </p:ext>
+    </p:extLst>
+  </p:cSld>
+  <p:clrMapOvr>
+    <a:masterClrMapping/>
+  </p:clrMapOvr>
+</p:sld>
+</file>
+
+<file path=ppt/slides/slide12.xml><?xml version="1.0" encoding="utf-8"?>
+<p:sld xmlns:a="http://schemas.openxmlformats.org/drawingml/2006/main" xmlns:r="http://schemas.openxmlformats.org/officeDocument/2006/relationships" xmlns:p="http://schemas.openxmlformats.org/presentationml/2006/main">
+  <p:cSld>
+    <p:spTree>
+      <p:nvGrpSpPr>
+        <p:cNvPr id="1" name=""/>
+        <p:cNvGrpSpPr/>
+        <p:nvPr/>
+      </p:nvGrpSpPr>
+      <p:grpSpPr>
+        <a:xfrm>
+          <a:off x="0" y="0"/>
+          <a:ext cx="0" cy="0"/>
+          <a:chOff x="0" y="0"/>
+          <a:chExt cx="0" cy="0"/>
+        </a:xfrm>
+      </p:grpSpPr>
+      <p:sp>
+        <p:nvSpPr>
+          <p:cNvPr id="2" name="Content Placeholder 1">
+            <a:extLst>
+              <a:ext uri="{FF2B5EF4-FFF2-40B4-BE49-F238E27FC236}">
+                <a16:creationId xmlns:a16="http://schemas.microsoft.com/office/drawing/2014/main" id="{A7CBE74B-2EED-44E3-A630-FAB07C1CB2BA}"/>
+              </a:ext>
+            </a:extLst>
+          </p:cNvPr>
+          <p:cNvSpPr>
+            <a:spLocks noGrp="1"/>
+          </p:cNvSpPr>
+          <p:nvPr>
+            <p:ph idx="1"/>
+          </p:nvPr>
+        </p:nvSpPr>
+        <p:spPr/>
+        <p:txBody>
+          <a:bodyPr/>
+          <a:lstStyle/>
+          <a:p>
+            <a:r>
+              <a:rPr lang="en-CA" dirty="0"/>
+              <a:t>Review estimated parameters and likelihood </a:t>
+            </a:r>
+          </a:p>
+          <a:p>
+            <a:r>
+              <a:rPr lang="en-CA" dirty="0"/>
+              <a:t>Examine </a:t>
+            </a:r>
+            <a:r>
+              <a:rPr lang="en-US" dirty="0"/>
+              <a:t>Pseudo-residuals using  </a:t>
+            </a:r>
+            <a:r>
+              <a:rPr lang="en-US" sz="2400" spc="-107" dirty="0" err="1">
+                <a:solidFill>
+                  <a:schemeClr val="bg2">
+                    <a:lumMod val="10000"/>
+                  </a:schemeClr>
+                </a:solidFill>
+                <a:latin typeface="Lucida Console" panose="020B0609040504020204" pitchFamily="49" charset="0"/>
+                <a:cs typeface="Courier New" panose="02070309020205020404" pitchFamily="49" charset="0"/>
+              </a:rPr>
+              <a:t>plotPR</a:t>
+            </a:r>
+            <a:endParaRPr lang="en-US" sz="2400" spc="-107" dirty="0">
+              <a:solidFill>
+                <a:schemeClr val="bg2">
+                  <a:lumMod val="10000"/>
+                </a:schemeClr>
+              </a:solidFill>
+              <a:latin typeface="Lucida Console" panose="020B0609040504020204" pitchFamily="49" charset="0"/>
+              <a:cs typeface="Courier New" panose="02070309020205020404" pitchFamily="49" charset="0"/>
+            </a:endParaRPr>
+          </a:p>
+          <a:p>
+            <a:r>
+              <a:rPr lang="en-CA" sz="2400" dirty="0"/>
+              <a:t>Simulate tracks using </a:t>
+            </a:r>
+            <a:r>
+              <a:rPr lang="en-CA" sz="2400" spc="-107" dirty="0" err="1">
+                <a:solidFill>
+                  <a:schemeClr val="bg2">
+                    <a:lumMod val="10000"/>
+                  </a:schemeClr>
+                </a:solidFill>
+                <a:latin typeface="Lucida Console" panose="020B0609040504020204" pitchFamily="49" charset="0"/>
+                <a:cs typeface="Courier New" panose="02070309020205020404" pitchFamily="49" charset="0"/>
+              </a:rPr>
+              <a:t>simData</a:t>
+            </a:r>
+            <a:endParaRPr lang="en-CA" sz="2400" spc="-107" dirty="0">
+              <a:solidFill>
+                <a:schemeClr val="bg2">
+                  <a:lumMod val="10000"/>
+                </a:schemeClr>
+              </a:solidFill>
+              <a:latin typeface="Lucida Console" panose="020B0609040504020204" pitchFamily="49" charset="0"/>
+              <a:cs typeface="Courier New" panose="02070309020205020404" pitchFamily="49" charset="0"/>
+            </a:endParaRPr>
+          </a:p>
+          <a:p>
+            <a:r>
+              <a:rPr lang="en-CA" sz="2400" dirty="0"/>
+              <a:t>Check confidence intervals using </a:t>
+            </a:r>
+            <a:r>
+              <a:rPr lang="en-CA" sz="2400" spc="-107" dirty="0" err="1">
+                <a:solidFill>
+                  <a:schemeClr val="bg2">
+                    <a:lumMod val="10000"/>
+                  </a:schemeClr>
+                </a:solidFill>
+                <a:latin typeface="Lucida Console" panose="020B0609040504020204" pitchFamily="49" charset="0"/>
+                <a:cs typeface="Courier New" panose="02070309020205020404" pitchFamily="49" charset="0"/>
+              </a:rPr>
+              <a:t>CIreal</a:t>
+            </a:r>
+            <a:endParaRPr lang="en-US" sz="2400" spc="-107" dirty="0">
+              <a:solidFill>
+                <a:schemeClr val="bg2">
+                  <a:lumMod val="10000"/>
+                </a:schemeClr>
+              </a:solidFill>
+              <a:latin typeface="Lucida Console" panose="020B0609040504020204" pitchFamily="49" charset="0"/>
+              <a:cs typeface="Courier New" panose="02070309020205020404" pitchFamily="49" charset="0"/>
+            </a:endParaRPr>
+          </a:p>
+        </p:txBody>
+      </p:sp>
+      <p:sp>
+        <p:nvSpPr>
+          <p:cNvPr id="3" name="Slide Number Placeholder 2">
+            <a:extLst>
+              <a:ext uri="{FF2B5EF4-FFF2-40B4-BE49-F238E27FC236}">
+                <a16:creationId xmlns:a16="http://schemas.microsoft.com/office/drawing/2014/main" id="{4246CD2A-F44A-45BF-A7E7-99E5AB9C0997}"/>
+              </a:ext>
+            </a:extLst>
+          </p:cNvPr>
+          <p:cNvSpPr>
+            <a:spLocks noGrp="1"/>
+          </p:cNvSpPr>
+          <p:nvPr>
+            <p:ph type="sldNum" sz="quarter" idx="12"/>
+          </p:nvPr>
+        </p:nvSpPr>
+        <p:spPr/>
+        <p:txBody>
+          <a:bodyPr/>
+          <a:lstStyle/>
+          <a:p>
+            <a:fld id="{E50A8D5F-7A10-4D19-B2BD-04FE5CA3B31F}" type="slidenum">
+              <a:rPr lang="en-US" smtClean="0"/>
+              <a:pPr/>
+              <a:t>12</a:t>
+            </a:fld>
+            <a:endParaRPr lang="en-US" dirty="0"/>
+          </a:p>
+        </p:txBody>
+      </p:sp>
+      <p:sp>
+        <p:nvSpPr>
+          <p:cNvPr id="4" name="Title 3">
+            <a:extLst>
+              <a:ext uri="{FF2B5EF4-FFF2-40B4-BE49-F238E27FC236}">
+                <a16:creationId xmlns:a16="http://schemas.microsoft.com/office/drawing/2014/main" id="{923D21AF-BBFC-4231-AEC1-2FD89EED9E27}"/>
+              </a:ext>
+            </a:extLst>
+          </p:cNvPr>
+          <p:cNvSpPr>
+            <a:spLocks noGrp="1"/>
+          </p:cNvSpPr>
+          <p:nvPr>
+            <p:ph type="title"/>
+          </p:nvPr>
+        </p:nvSpPr>
+        <p:spPr/>
+        <p:txBody>
+          <a:bodyPr/>
+          <a:lstStyle/>
+          <a:p>
+            <a:r>
+              <a:rPr lang="en-CA" dirty="0"/>
+              <a:t>3. Assessing model fit and quality</a:t>
+            </a:r>
+            <a:endParaRPr lang="en-US" dirty="0"/>
           </a:p>
         </p:txBody>
       </p:sp>
@@ -4132,6 +4994,557 @@
     <p:extLst>
       <p:ext uri="{BB962C8B-B14F-4D97-AF65-F5344CB8AC3E}">
         <p14:creationId xmlns:p14="http://schemas.microsoft.com/office/powerpoint/2010/main" val="4278494816"/>
+      </p:ext>
+    </p:extLst>
+  </p:cSld>
+  <p:clrMapOvr>
+    <a:masterClrMapping/>
+  </p:clrMapOvr>
+</p:sld>
+</file>
+
+<file path=ppt/slides/slide13.xml><?xml version="1.0" encoding="utf-8"?>
+<p:sld xmlns:a="http://schemas.openxmlformats.org/drawingml/2006/main" xmlns:r="http://schemas.openxmlformats.org/officeDocument/2006/relationships" xmlns:p="http://schemas.openxmlformats.org/presentationml/2006/main">
+  <p:cSld>
+    <p:spTree>
+      <p:nvGrpSpPr>
+        <p:cNvPr id="1" name=""/>
+        <p:cNvGrpSpPr/>
+        <p:nvPr/>
+      </p:nvGrpSpPr>
+      <p:grpSpPr>
+        <a:xfrm>
+          <a:off x="0" y="0"/>
+          <a:ext cx="0" cy="0"/>
+          <a:chOff x="0" y="0"/>
+          <a:chExt cx="0" cy="0"/>
+        </a:xfrm>
+      </p:grpSpPr>
+      <p:sp>
+        <p:nvSpPr>
+          <p:cNvPr id="2" name="Content Placeholder 1">
+            <a:extLst>
+              <a:ext uri="{FF2B5EF4-FFF2-40B4-BE49-F238E27FC236}">
+                <a16:creationId xmlns:a16="http://schemas.microsoft.com/office/drawing/2014/main" id="{A7CBE74B-2EED-44E3-A630-FAB07C1CB2BA}"/>
+              </a:ext>
+            </a:extLst>
+          </p:cNvPr>
+          <p:cNvSpPr>
+            <a:spLocks noGrp="1"/>
+          </p:cNvSpPr>
+          <p:nvPr>
+            <p:ph idx="1"/>
+          </p:nvPr>
+        </p:nvSpPr>
+        <p:spPr/>
+        <p:txBody>
+          <a:bodyPr/>
+          <a:lstStyle/>
+          <a:p>
+            <a:r>
+              <a:rPr lang="en-CA" dirty="0"/>
+              <a:t>Examine effect of environmental covariate on behaviour probability</a:t>
+            </a:r>
+          </a:p>
+          <a:p>
+            <a:r>
+              <a:rPr lang="en-CA" dirty="0"/>
+              <a:t>Model transition probabilities as function of covariate using </a:t>
+            </a:r>
+            <a:r>
+              <a:rPr lang="en-CA" spc="-107" dirty="0">
+                <a:solidFill>
+                  <a:schemeClr val="bg2">
+                    <a:lumMod val="10000"/>
+                  </a:schemeClr>
+                </a:solidFill>
+                <a:latin typeface="Lucida Console" panose="020B0609040504020204" pitchFamily="49" charset="0"/>
+                <a:cs typeface="Courier New" panose="02070309020205020404" pitchFamily="49" charset="0"/>
+              </a:rPr>
+              <a:t>Formula </a:t>
+            </a:r>
+            <a:r>
+              <a:rPr lang="en-CA" dirty="0"/>
+              <a:t>argument in </a:t>
+            </a:r>
+            <a:r>
+              <a:rPr lang="en-CA" spc="-107" dirty="0" err="1">
+                <a:solidFill>
+                  <a:schemeClr val="bg2">
+                    <a:lumMod val="10000"/>
+                  </a:schemeClr>
+                </a:solidFill>
+                <a:latin typeface="Lucida Console" panose="020B0609040504020204" pitchFamily="49" charset="0"/>
+                <a:cs typeface="Courier New" panose="02070309020205020404" pitchFamily="49" charset="0"/>
+              </a:rPr>
+              <a:t>fitHMM</a:t>
+            </a:r>
+            <a:endParaRPr lang="en-CA" spc="-107" dirty="0">
+              <a:solidFill>
+                <a:schemeClr val="bg2">
+                  <a:lumMod val="10000"/>
+                </a:schemeClr>
+              </a:solidFill>
+              <a:latin typeface="Lucida Console" panose="020B0609040504020204" pitchFamily="49" charset="0"/>
+              <a:cs typeface="Courier New" panose="02070309020205020404" pitchFamily="49" charset="0"/>
+            </a:endParaRPr>
+          </a:p>
+          <a:p>
+            <a:r>
+              <a:rPr lang="en-CA" dirty="0"/>
+              <a:t>Examine relationship using </a:t>
+            </a:r>
+            <a:r>
+              <a:rPr lang="en-CA" spc="-107" dirty="0">
+                <a:solidFill>
+                  <a:schemeClr val="bg2">
+                    <a:lumMod val="10000"/>
+                  </a:schemeClr>
+                </a:solidFill>
+                <a:latin typeface="Lucida Console" panose="020B0609040504020204" pitchFamily="49" charset="0"/>
+                <a:cs typeface="Courier New" panose="02070309020205020404" pitchFamily="49" charset="0"/>
+              </a:rPr>
+              <a:t>plot </a:t>
+            </a:r>
+            <a:r>
+              <a:rPr lang="en-CA" dirty="0"/>
+              <a:t>and</a:t>
+            </a:r>
+            <a:r>
+              <a:rPr lang="en-CA" spc="-107" dirty="0">
+                <a:solidFill>
+                  <a:schemeClr val="bg2">
+                    <a:lumMod val="10000"/>
+                  </a:schemeClr>
+                </a:solidFill>
+                <a:latin typeface="Lucida Console" panose="020B0609040504020204" pitchFamily="49" charset="0"/>
+                <a:cs typeface="Courier New" panose="02070309020205020404" pitchFamily="49" charset="0"/>
+              </a:rPr>
+              <a:t> </a:t>
+            </a:r>
+            <a:r>
+              <a:rPr lang="en-CA" spc="-107" dirty="0" err="1">
+                <a:solidFill>
+                  <a:schemeClr val="bg2">
+                    <a:lumMod val="10000"/>
+                  </a:schemeClr>
+                </a:solidFill>
+                <a:latin typeface="Lucida Console" panose="020B0609040504020204" pitchFamily="49" charset="0"/>
+                <a:cs typeface="Courier New" panose="02070309020205020404" pitchFamily="49" charset="0"/>
+              </a:rPr>
+              <a:t>plotStationary</a:t>
+            </a:r>
+            <a:endParaRPr lang="en-CA" spc="-107" dirty="0">
+              <a:solidFill>
+                <a:schemeClr val="bg2">
+                  <a:lumMod val="10000"/>
+                </a:schemeClr>
+              </a:solidFill>
+              <a:latin typeface="Lucida Console" panose="020B0609040504020204" pitchFamily="49" charset="0"/>
+              <a:cs typeface="Courier New" panose="02070309020205020404" pitchFamily="49" charset="0"/>
+            </a:endParaRPr>
+          </a:p>
+          <a:p>
+            <a:endParaRPr lang="en-US" spc="-107" dirty="0">
+              <a:solidFill>
+                <a:schemeClr val="bg2">
+                  <a:lumMod val="10000"/>
+                </a:schemeClr>
+              </a:solidFill>
+              <a:latin typeface="Lucida Console" panose="020B0609040504020204" pitchFamily="49" charset="0"/>
+              <a:cs typeface="Courier New" panose="02070309020205020404" pitchFamily="49" charset="0"/>
+            </a:endParaRPr>
+          </a:p>
+        </p:txBody>
+      </p:sp>
+      <p:sp>
+        <p:nvSpPr>
+          <p:cNvPr id="3" name="Slide Number Placeholder 2">
+            <a:extLst>
+              <a:ext uri="{FF2B5EF4-FFF2-40B4-BE49-F238E27FC236}">
+                <a16:creationId xmlns:a16="http://schemas.microsoft.com/office/drawing/2014/main" id="{4246CD2A-F44A-45BF-A7E7-99E5AB9C0997}"/>
+              </a:ext>
+            </a:extLst>
+          </p:cNvPr>
+          <p:cNvSpPr>
+            <a:spLocks noGrp="1"/>
+          </p:cNvSpPr>
+          <p:nvPr>
+            <p:ph type="sldNum" sz="quarter" idx="12"/>
+          </p:nvPr>
+        </p:nvSpPr>
+        <p:spPr/>
+        <p:txBody>
+          <a:bodyPr/>
+          <a:lstStyle/>
+          <a:p>
+            <a:fld id="{E50A8D5F-7A10-4D19-B2BD-04FE5CA3B31F}" type="slidenum">
+              <a:rPr lang="en-US" smtClean="0"/>
+              <a:pPr/>
+              <a:t>13</a:t>
+            </a:fld>
+            <a:endParaRPr lang="en-US" dirty="0"/>
+          </a:p>
+        </p:txBody>
+      </p:sp>
+      <p:sp>
+        <p:nvSpPr>
+          <p:cNvPr id="4" name="Title 3">
+            <a:extLst>
+              <a:ext uri="{FF2B5EF4-FFF2-40B4-BE49-F238E27FC236}">
+                <a16:creationId xmlns:a16="http://schemas.microsoft.com/office/drawing/2014/main" id="{923D21AF-BBFC-4231-AEC1-2FD89EED9E27}"/>
+              </a:ext>
+            </a:extLst>
+          </p:cNvPr>
+          <p:cNvSpPr>
+            <a:spLocks noGrp="1"/>
+          </p:cNvSpPr>
+          <p:nvPr>
+            <p:ph type="title"/>
+          </p:nvPr>
+        </p:nvSpPr>
+        <p:spPr/>
+        <p:txBody>
+          <a:bodyPr/>
+          <a:lstStyle/>
+          <a:p>
+            <a:r>
+              <a:rPr lang="en-CA" dirty="0"/>
+              <a:t>4. Transition probability covariates</a:t>
+            </a:r>
+          </a:p>
+        </p:txBody>
+      </p:sp>
+    </p:spTree>
+    <p:extLst>
+      <p:ext uri="{BB962C8B-B14F-4D97-AF65-F5344CB8AC3E}">
+        <p14:creationId xmlns:p14="http://schemas.microsoft.com/office/powerpoint/2010/main" val="1140254073"/>
+      </p:ext>
+    </p:extLst>
+  </p:cSld>
+  <p:clrMapOvr>
+    <a:masterClrMapping/>
+  </p:clrMapOvr>
+</p:sld>
+</file>
+
+<file path=ppt/slides/slide14.xml><?xml version="1.0" encoding="utf-8"?>
+<p:sld xmlns:a="http://schemas.openxmlformats.org/drawingml/2006/main" xmlns:r="http://schemas.openxmlformats.org/officeDocument/2006/relationships" xmlns:p="http://schemas.openxmlformats.org/presentationml/2006/main">
+  <p:cSld>
+    <p:spTree>
+      <p:nvGrpSpPr>
+        <p:cNvPr id="1" name=""/>
+        <p:cNvGrpSpPr/>
+        <p:nvPr/>
+      </p:nvGrpSpPr>
+      <p:grpSpPr>
+        <a:xfrm>
+          <a:off x="0" y="0"/>
+          <a:ext cx="0" cy="0"/>
+          <a:chOff x="0" y="0"/>
+          <a:chExt cx="0" cy="0"/>
+        </a:xfrm>
+      </p:grpSpPr>
+      <p:sp>
+        <p:nvSpPr>
+          <p:cNvPr id="2" name="Content Placeholder 1">
+            <a:extLst>
+              <a:ext uri="{FF2B5EF4-FFF2-40B4-BE49-F238E27FC236}">
+                <a16:creationId xmlns:a16="http://schemas.microsoft.com/office/drawing/2014/main" id="{5B9B7B8E-4D36-46D8-AB9D-FAD37AFDB41C}"/>
+              </a:ext>
+            </a:extLst>
+          </p:cNvPr>
+          <p:cNvSpPr>
+            <a:spLocks noGrp="1"/>
+          </p:cNvSpPr>
+          <p:nvPr>
+            <p:ph idx="1"/>
+          </p:nvPr>
+        </p:nvSpPr>
+        <p:spPr/>
+        <p:txBody>
+          <a:bodyPr/>
+          <a:lstStyle/>
+          <a:p>
+            <a:r>
+              <a:rPr lang="en-CA" dirty="0"/>
+              <a:t>Examine effect of covariates on emission probabilities</a:t>
+            </a:r>
+          </a:p>
+          <a:p>
+            <a:r>
+              <a:rPr lang="en-CA" dirty="0"/>
+              <a:t>Model data stream parameters as function of covariate using </a:t>
+            </a:r>
+            <a:br>
+              <a:rPr lang="en-CA" dirty="0"/>
+            </a:br>
+            <a:r>
+              <a:rPr lang="en-CA" spc="-107" dirty="0">
+                <a:solidFill>
+                  <a:schemeClr val="bg2">
+                    <a:lumMod val="10000"/>
+                  </a:schemeClr>
+                </a:solidFill>
+                <a:latin typeface="Lucida Console" panose="020B0609040504020204" pitchFamily="49" charset="0"/>
+                <a:cs typeface="Courier New" panose="02070309020205020404" pitchFamily="49" charset="0"/>
+              </a:rPr>
+              <a:t>DM </a:t>
+            </a:r>
+            <a:r>
+              <a:rPr lang="en-CA" dirty="0"/>
+              <a:t>argument in </a:t>
+            </a:r>
+            <a:r>
+              <a:rPr lang="en-CA" spc="-107" dirty="0" err="1">
+                <a:solidFill>
+                  <a:schemeClr val="bg2">
+                    <a:lumMod val="10000"/>
+                  </a:schemeClr>
+                </a:solidFill>
+                <a:latin typeface="Lucida Console" panose="020B0609040504020204" pitchFamily="49" charset="0"/>
+                <a:cs typeface="Courier New" panose="02070309020205020404" pitchFamily="49" charset="0"/>
+              </a:rPr>
+              <a:t>fitHMM</a:t>
+            </a:r>
+            <a:endParaRPr lang="en-CA" spc="-107" dirty="0">
+              <a:solidFill>
+                <a:schemeClr val="bg2">
+                  <a:lumMod val="10000"/>
+                </a:schemeClr>
+              </a:solidFill>
+              <a:latin typeface="Lucida Console" panose="020B0609040504020204" pitchFamily="49" charset="0"/>
+              <a:cs typeface="Courier New" panose="02070309020205020404" pitchFamily="49" charset="0"/>
+            </a:endParaRPr>
+          </a:p>
+          <a:p>
+            <a:r>
+              <a:rPr lang="en-CA" dirty="0"/>
+              <a:t>Examine relationship using </a:t>
+            </a:r>
+            <a:r>
+              <a:rPr lang="en-CA" spc="-107" dirty="0">
+                <a:solidFill>
+                  <a:schemeClr val="bg2">
+                    <a:lumMod val="10000"/>
+                  </a:schemeClr>
+                </a:solidFill>
+                <a:latin typeface="Lucida Console" panose="020B0609040504020204" pitchFamily="49" charset="0"/>
+                <a:cs typeface="Courier New" panose="02070309020205020404" pitchFamily="49" charset="0"/>
+              </a:rPr>
+              <a:t>plot</a:t>
+            </a:r>
+            <a:endParaRPr lang="en-US" dirty="0"/>
+          </a:p>
+        </p:txBody>
+      </p:sp>
+      <p:sp>
+        <p:nvSpPr>
+          <p:cNvPr id="3" name="Slide Number Placeholder 2">
+            <a:extLst>
+              <a:ext uri="{FF2B5EF4-FFF2-40B4-BE49-F238E27FC236}">
+                <a16:creationId xmlns:a16="http://schemas.microsoft.com/office/drawing/2014/main" id="{CE60055D-A6DC-44C4-9983-99734281F0A8}"/>
+              </a:ext>
+            </a:extLst>
+          </p:cNvPr>
+          <p:cNvSpPr>
+            <a:spLocks noGrp="1"/>
+          </p:cNvSpPr>
+          <p:nvPr>
+            <p:ph type="sldNum" sz="quarter" idx="12"/>
+          </p:nvPr>
+        </p:nvSpPr>
+        <p:spPr/>
+        <p:txBody>
+          <a:bodyPr/>
+          <a:lstStyle/>
+          <a:p>
+            <a:fld id="{E50A8D5F-7A10-4D19-B2BD-04FE5CA3B31F}" type="slidenum">
+              <a:rPr lang="en-US" smtClean="0"/>
+              <a:pPr/>
+              <a:t>14</a:t>
+            </a:fld>
+            <a:endParaRPr lang="en-US" dirty="0"/>
+          </a:p>
+        </p:txBody>
+      </p:sp>
+      <p:sp>
+        <p:nvSpPr>
+          <p:cNvPr id="4" name="Title 3">
+            <a:extLst>
+              <a:ext uri="{FF2B5EF4-FFF2-40B4-BE49-F238E27FC236}">
+                <a16:creationId xmlns:a16="http://schemas.microsoft.com/office/drawing/2014/main" id="{D307F46C-7F60-4FDE-B881-F4F0F667520B}"/>
+              </a:ext>
+            </a:extLst>
+          </p:cNvPr>
+          <p:cNvSpPr>
+            <a:spLocks noGrp="1"/>
+          </p:cNvSpPr>
+          <p:nvPr>
+            <p:ph type="title"/>
+          </p:nvPr>
+        </p:nvSpPr>
+        <p:spPr/>
+        <p:txBody>
+          <a:bodyPr/>
+          <a:lstStyle/>
+          <a:p>
+            <a:r>
+              <a:rPr lang="en-CA" dirty="0"/>
+              <a:t>5. Emission probability covariates</a:t>
+            </a:r>
+            <a:endParaRPr lang="en-US" dirty="0"/>
+          </a:p>
+        </p:txBody>
+      </p:sp>
+    </p:spTree>
+    <p:extLst>
+      <p:ext uri="{BB962C8B-B14F-4D97-AF65-F5344CB8AC3E}">
+        <p14:creationId xmlns:p14="http://schemas.microsoft.com/office/powerpoint/2010/main" val="3002452183"/>
+      </p:ext>
+    </p:extLst>
+  </p:cSld>
+  <p:clrMapOvr>
+    <a:masterClrMapping/>
+  </p:clrMapOvr>
+</p:sld>
+</file>
+
+<file path=ppt/slides/slide15.xml><?xml version="1.0" encoding="utf-8"?>
+<p:sld xmlns:a="http://schemas.openxmlformats.org/drawingml/2006/main" xmlns:r="http://schemas.openxmlformats.org/officeDocument/2006/relationships" xmlns:p="http://schemas.openxmlformats.org/presentationml/2006/main">
+  <p:cSld>
+    <p:spTree>
+      <p:nvGrpSpPr>
+        <p:cNvPr id="1" name=""/>
+        <p:cNvGrpSpPr/>
+        <p:nvPr/>
+      </p:nvGrpSpPr>
+      <p:grpSpPr>
+        <a:xfrm>
+          <a:off x="0" y="0"/>
+          <a:ext cx="0" cy="0"/>
+          <a:chOff x="0" y="0"/>
+          <a:chExt cx="0" cy="0"/>
+        </a:xfrm>
+      </p:grpSpPr>
+      <p:sp>
+        <p:nvSpPr>
+          <p:cNvPr id="2" name="Content Placeholder 1">
+            <a:extLst>
+              <a:ext uri="{FF2B5EF4-FFF2-40B4-BE49-F238E27FC236}">
+                <a16:creationId xmlns:a16="http://schemas.microsoft.com/office/drawing/2014/main" id="{70547F2B-DD29-4EF4-8C6D-3CCD1287CD40}"/>
+              </a:ext>
+            </a:extLst>
+          </p:cNvPr>
+          <p:cNvSpPr>
+            <a:spLocks noGrp="1"/>
+          </p:cNvSpPr>
+          <p:nvPr>
+            <p:ph idx="1"/>
+          </p:nvPr>
+        </p:nvSpPr>
+        <p:spPr/>
+        <p:txBody>
+          <a:bodyPr/>
+          <a:lstStyle/>
+          <a:p>
+            <a:r>
+              <a:rPr lang="en-CA" dirty="0"/>
+              <a:t>Examine effect of interpolating track to different resolutions (e.g., 1, 4, or 8 hours)</a:t>
+            </a:r>
+          </a:p>
+          <a:p>
+            <a:r>
+              <a:rPr lang="en-CA" dirty="0"/>
+              <a:t>Effect on:</a:t>
+            </a:r>
+          </a:p>
+          <a:p>
+            <a:pPr lvl="1"/>
+            <a:r>
+              <a:rPr lang="en-CA" dirty="0"/>
+              <a:t>Estimated parameters</a:t>
+            </a:r>
+          </a:p>
+          <a:p>
+            <a:pPr lvl="1"/>
+            <a:r>
+              <a:rPr lang="en-CA" dirty="0"/>
+              <a:t>Predicted states</a:t>
+            </a:r>
+          </a:p>
+          <a:p>
+            <a:pPr lvl="1"/>
+            <a:r>
+              <a:rPr lang="en-CA" dirty="0"/>
+              <a:t>Model fit</a:t>
+            </a:r>
+          </a:p>
+        </p:txBody>
+      </p:sp>
+      <p:sp>
+        <p:nvSpPr>
+          <p:cNvPr id="3" name="Slide Number Placeholder 2">
+            <a:extLst>
+              <a:ext uri="{FF2B5EF4-FFF2-40B4-BE49-F238E27FC236}">
+                <a16:creationId xmlns:a16="http://schemas.microsoft.com/office/drawing/2014/main" id="{C220B5BF-C783-46E4-B52E-7ECD5A260F31}"/>
+              </a:ext>
+            </a:extLst>
+          </p:cNvPr>
+          <p:cNvSpPr>
+            <a:spLocks noGrp="1"/>
+          </p:cNvSpPr>
+          <p:nvPr>
+            <p:ph type="sldNum" sz="quarter" idx="12"/>
+          </p:nvPr>
+        </p:nvSpPr>
+        <p:spPr/>
+        <p:txBody>
+          <a:bodyPr/>
+          <a:lstStyle/>
+          <a:p>
+            <a:fld id="{E50A8D5F-7A10-4D19-B2BD-04FE5CA3B31F}" type="slidenum">
+              <a:rPr lang="en-US" smtClean="0"/>
+              <a:pPr/>
+              <a:t>15</a:t>
+            </a:fld>
+            <a:endParaRPr lang="en-US" dirty="0"/>
+          </a:p>
+        </p:txBody>
+      </p:sp>
+      <p:sp>
+        <p:nvSpPr>
+          <p:cNvPr id="4" name="Title 3">
+            <a:extLst>
+              <a:ext uri="{FF2B5EF4-FFF2-40B4-BE49-F238E27FC236}">
+                <a16:creationId xmlns:a16="http://schemas.microsoft.com/office/drawing/2014/main" id="{777E7982-230A-40A2-8D52-51F0DB188677}"/>
+              </a:ext>
+            </a:extLst>
+          </p:cNvPr>
+          <p:cNvSpPr>
+            <a:spLocks noGrp="1"/>
+          </p:cNvSpPr>
+          <p:nvPr>
+            <p:ph type="title"/>
+          </p:nvPr>
+        </p:nvSpPr>
+        <p:spPr/>
+        <p:txBody>
+          <a:bodyPr/>
+          <a:lstStyle/>
+          <a:p>
+            <a:r>
+              <a:rPr lang="en-CA" dirty="0"/>
+              <a:t>6. Effect of temporal resolution </a:t>
+            </a:r>
+            <a:endParaRPr lang="en-US" dirty="0"/>
+          </a:p>
+        </p:txBody>
+      </p:sp>
+    </p:spTree>
+    <p:extLst>
+      <p:ext uri="{BB962C8B-B14F-4D97-AF65-F5344CB8AC3E}">
+        <p14:creationId xmlns:p14="http://schemas.microsoft.com/office/powerpoint/2010/main" val="1605605491"/>
       </p:ext>
     </p:extLst>
   </p:cSld>
@@ -4174,17 +5587,23 @@
             <p:ph idx="1"/>
           </p:nvPr>
         </p:nvSpPr>
-        <p:spPr/>
+        <p:spPr>
+          <a:xfrm>
+            <a:off x="623947" y="1431144"/>
+            <a:ext cx="5403431" cy="4726088"/>
+          </a:xfrm>
+        </p:spPr>
         <p:txBody>
           <a:bodyPr/>
           <a:lstStyle/>
           <a:p>
             <a:pPr marL="514350" indent="-514350">
+              <a:buFont typeface="Quicksand" panose="02070303000000060000" pitchFamily="18" charset="0"/>
               <a:buAutoNum type="arabicPeriod"/>
             </a:pPr>
             <a:r>
               <a:rPr lang="en-CA" dirty="0"/>
-              <a:t>Unzip workshop file</a:t>
+              <a:t>Download workshop ZIP</a:t>
             </a:r>
           </a:p>
           <a:p>
@@ -4256,10 +5675,10 @@
       </p:sp>
       <p:pic>
         <p:nvPicPr>
-          <p:cNvPr id="5" name="Picture 4">
-            <a:extLst>
-              <a:ext uri="{FF2B5EF4-FFF2-40B4-BE49-F238E27FC236}">
-                <a16:creationId xmlns:a16="http://schemas.microsoft.com/office/drawing/2014/main" id="{E8004E02-EA56-438C-8DDE-63B1FD626C06}"/>
+          <p:cNvPr id="9" name="Picture 8">
+            <a:extLst>
+              <a:ext uri="{FF2B5EF4-FFF2-40B4-BE49-F238E27FC236}">
+                <a16:creationId xmlns:a16="http://schemas.microsoft.com/office/drawing/2014/main" id="{0F52DF13-8A22-4D6A-9F41-494D3A6E43CC}"/>
               </a:ext>
             </a:extLst>
           </p:cNvPr>
@@ -4276,8 +5695,8 @@
         </p:blipFill>
         <p:spPr>
           <a:xfrm>
-            <a:off x="4766254" y="1431143"/>
-            <a:ext cx="6801799" cy="4686954"/>
+            <a:off x="6437339" y="555796"/>
+            <a:ext cx="4583588" cy="6134835"/>
           </a:xfrm>
           <a:prstGeom prst="rect">
             <a:avLst/>
@@ -4286,10 +5705,10 @@
       </p:pic>
       <p:sp>
         <p:nvSpPr>
-          <p:cNvPr id="6" name="Oval 5">
-            <a:extLst>
-              <a:ext uri="{FF2B5EF4-FFF2-40B4-BE49-F238E27FC236}">
-                <a16:creationId xmlns:a16="http://schemas.microsoft.com/office/drawing/2014/main" id="{752B2E6C-6307-413A-96D5-78344124A07C}"/>
+          <p:cNvPr id="10" name="Oval 9">
+            <a:extLst>
+              <a:ext uri="{FF2B5EF4-FFF2-40B4-BE49-F238E27FC236}">
+                <a16:creationId xmlns:a16="http://schemas.microsoft.com/office/drawing/2014/main" id="{35D20A91-B1C4-4396-B7AD-930DA62601D9}"/>
               </a:ext>
             </a:extLst>
           </p:cNvPr>
@@ -4298,8 +5717,54 @@
         </p:nvSpPr>
         <p:spPr>
           <a:xfrm>
-            <a:off x="6999316" y="3707476"/>
-            <a:ext cx="1596044" cy="433768"/>
+            <a:off x="10010274" y="2777034"/>
+            <a:ext cx="1195137" cy="511598"/>
+          </a:xfrm>
+          <a:prstGeom prst="ellipse">
+            <a:avLst/>
+          </a:prstGeom>
+          <a:noFill/>
+          <a:ln w="38100"/>
+        </p:spPr>
+        <p:style>
+          <a:lnRef idx="2">
+            <a:schemeClr val="accent2"/>
+          </a:lnRef>
+          <a:fillRef idx="1">
+            <a:schemeClr val="lt1"/>
+          </a:fillRef>
+          <a:effectRef idx="0">
+            <a:schemeClr val="accent2"/>
+          </a:effectRef>
+          <a:fontRef idx="minor">
+            <a:schemeClr val="dk1"/>
+          </a:fontRef>
+        </p:style>
+        <p:txBody>
+          <a:bodyPr rtlCol="0" anchor="ctr"/>
+          <a:lstStyle/>
+          <a:p>
+            <a:pPr algn="ctr"/>
+            <a:endParaRPr lang="en-US"/>
+          </a:p>
+        </p:txBody>
+      </p:sp>
+      <p:sp>
+        <p:nvSpPr>
+          <p:cNvPr id="11" name="Oval 10">
+            <a:extLst>
+              <a:ext uri="{FF2B5EF4-FFF2-40B4-BE49-F238E27FC236}">
+                <a16:creationId xmlns:a16="http://schemas.microsoft.com/office/drawing/2014/main" id="{D62E0D56-61BF-4B5E-9AF9-BB2A1FF4034C}"/>
+              </a:ext>
+            </a:extLst>
+          </p:cNvPr>
+          <p:cNvSpPr/>
+          <p:nvPr/>
+        </p:nvSpPr>
+        <p:spPr>
+          <a:xfrm>
+            <a:off x="7323222" y="5432003"/>
+            <a:ext cx="1371599" cy="511598"/>
           </a:xfrm>
           <a:prstGeom prst="ellipse">
             <a:avLst/>
@@ -4360,12 +5825,118 @@
           <a:chExt cx="0" cy="0"/>
         </a:xfrm>
       </p:grpSpPr>
+      <p:sp>
+        <p:nvSpPr>
+          <p:cNvPr id="2" name="Content Placeholder 1">
+            <a:extLst>
+              <a:ext uri="{FF2B5EF4-FFF2-40B4-BE49-F238E27FC236}">
+                <a16:creationId xmlns:a16="http://schemas.microsoft.com/office/drawing/2014/main" id="{5A592B84-F81F-4694-A26A-E3215D232023}"/>
+              </a:ext>
+            </a:extLst>
+          </p:cNvPr>
+          <p:cNvSpPr>
+            <a:spLocks noGrp="1"/>
+          </p:cNvSpPr>
+          <p:nvPr>
+            <p:ph idx="1"/>
+          </p:nvPr>
+        </p:nvSpPr>
+        <p:spPr/>
+        <p:txBody>
+          <a:bodyPr/>
+          <a:lstStyle/>
+          <a:p>
+            <a:pPr marL="514350" indent="-514350">
+              <a:buFont typeface="Quicksand" panose="02070303000000060000" pitchFamily="18" charset="0"/>
+              <a:buAutoNum type="arabicPeriod"/>
+            </a:pPr>
+            <a:r>
+              <a:rPr lang="en-CA" dirty="0"/>
+              <a:t>Download workshop ZIP</a:t>
+            </a:r>
+          </a:p>
+          <a:p>
+            <a:pPr marL="514350" indent="-514350">
+              <a:buAutoNum type="arabicPeriod"/>
+            </a:pPr>
+            <a:r>
+              <a:rPr lang="en-CA" dirty="0"/>
+              <a:t>Unzip workshop file</a:t>
+            </a:r>
+          </a:p>
+          <a:p>
+            <a:pPr marL="514350" indent="-514350">
+              <a:buAutoNum type="arabicPeriod"/>
+            </a:pPr>
+            <a:endParaRPr lang="en-US" dirty="0"/>
+          </a:p>
+        </p:txBody>
+      </p:sp>
+      <p:sp>
+        <p:nvSpPr>
+          <p:cNvPr id="3" name="Slide Number Placeholder 2">
+            <a:extLst>
+              <a:ext uri="{FF2B5EF4-FFF2-40B4-BE49-F238E27FC236}">
+                <a16:creationId xmlns:a16="http://schemas.microsoft.com/office/drawing/2014/main" id="{E86981B5-CB08-49DF-8D72-6AB5B34C700A}"/>
+              </a:ext>
+            </a:extLst>
+          </p:cNvPr>
+          <p:cNvSpPr>
+            <a:spLocks noGrp="1"/>
+          </p:cNvSpPr>
+          <p:nvPr>
+            <p:ph type="sldNum" sz="quarter" idx="12"/>
+          </p:nvPr>
+        </p:nvSpPr>
+        <p:spPr/>
+        <p:txBody>
+          <a:bodyPr/>
+          <a:lstStyle/>
+          <a:p>
+            <a:fld id="{E50A8D5F-7A10-4D19-B2BD-04FE5CA3B31F}" type="slidenum">
+              <a:rPr lang="en-US" smtClean="0"/>
+              <a:pPr/>
+              <a:t>3</a:t>
+            </a:fld>
+            <a:endParaRPr lang="en-US" dirty="0"/>
+          </a:p>
+        </p:txBody>
+      </p:sp>
+      <p:sp>
+        <p:nvSpPr>
+          <p:cNvPr id="4" name="Title 3">
+            <a:extLst>
+              <a:ext uri="{FF2B5EF4-FFF2-40B4-BE49-F238E27FC236}">
+                <a16:creationId xmlns:a16="http://schemas.microsoft.com/office/drawing/2014/main" id="{1315864D-DFFC-436D-84CD-3FE4AE1832A5}"/>
+              </a:ext>
+            </a:extLst>
+          </p:cNvPr>
+          <p:cNvSpPr>
+            <a:spLocks noGrp="1"/>
+          </p:cNvSpPr>
+          <p:nvPr>
+            <p:ph type="title"/>
+          </p:nvPr>
+        </p:nvSpPr>
+        <p:spPr/>
+        <p:txBody>
+          <a:bodyPr/>
+          <a:lstStyle/>
+          <a:p>
+            <a:r>
+              <a:rPr lang="en-CA" dirty="0"/>
+              <a:t>Tutorial setup</a:t>
+            </a:r>
+            <a:endParaRPr lang="en-US" dirty="0"/>
+          </a:p>
+        </p:txBody>
+      </p:sp>
       <p:pic>
         <p:nvPicPr>
-          <p:cNvPr id="9" name="Picture 8">
-            <a:extLst>
-              <a:ext uri="{FF2B5EF4-FFF2-40B4-BE49-F238E27FC236}">
-                <a16:creationId xmlns:a16="http://schemas.microsoft.com/office/drawing/2014/main" id="{4EC5381F-6DED-4F56-B18F-058B09999251}"/>
+          <p:cNvPr id="5" name="Picture 4">
+            <a:extLst>
+              <a:ext uri="{FF2B5EF4-FFF2-40B4-BE49-F238E27FC236}">
+                <a16:creationId xmlns:a16="http://schemas.microsoft.com/office/drawing/2014/main" id="{E8004E02-EA56-438C-8DDE-63B1FD626C06}"/>
               </a:ext>
             </a:extLst>
           </p:cNvPr>
@@ -4374,16 +5945,15 @@
           </p:cNvPicPr>
           <p:nvPr/>
         </p:nvPicPr>
-        <p:blipFill>
+        <p:blipFill rotWithShape="1">
           <a:blip r:embed="rId2"/>
-          <a:stretch>
-            <a:fillRect/>
-          </a:stretch>
+          <a:srcRect r="22519"/>
+          <a:stretch/>
         </p:blipFill>
         <p:spPr>
           <a:xfrm>
-            <a:off x="5951190" y="471470"/>
-            <a:ext cx="5451540" cy="5736034"/>
+            <a:off x="6174010" y="1253450"/>
+            <a:ext cx="5111611" cy="4545971"/>
           </a:xfrm>
           <a:prstGeom prst="rect">
             <a:avLst/>
@@ -4392,135 +5962,19 @@
       </p:pic>
       <p:sp>
         <p:nvSpPr>
-          <p:cNvPr id="2" name="Content Placeholder 1">
-            <a:extLst>
-              <a:ext uri="{FF2B5EF4-FFF2-40B4-BE49-F238E27FC236}">
-                <a16:creationId xmlns:a16="http://schemas.microsoft.com/office/drawing/2014/main" id="{5A592B84-F81F-4694-A26A-E3215D232023}"/>
-              </a:ext>
-            </a:extLst>
-          </p:cNvPr>
-          <p:cNvSpPr>
-            <a:spLocks noGrp="1"/>
-          </p:cNvSpPr>
-          <p:nvPr>
-            <p:ph idx="1"/>
-          </p:nvPr>
+          <p:cNvPr id="6" name="Oval 5">
+            <a:extLst>
+              <a:ext uri="{FF2B5EF4-FFF2-40B4-BE49-F238E27FC236}">
+                <a16:creationId xmlns:a16="http://schemas.microsoft.com/office/drawing/2014/main" id="{752B2E6C-6307-413A-96D5-78344124A07C}"/>
+              </a:ext>
+            </a:extLst>
+          </p:cNvPr>
+          <p:cNvSpPr/>
+          <p:nvPr/>
         </p:nvSpPr>
         <p:spPr>
           <a:xfrm>
-            <a:off x="623948" y="1431144"/>
-            <a:ext cx="4628152" cy="4726088"/>
-          </a:xfrm>
-        </p:spPr>
-        <p:txBody>
-          <a:bodyPr/>
-          <a:lstStyle/>
-          <a:p>
-            <a:pPr marL="514350" indent="-514350">
-              <a:buAutoNum type="arabicPeriod"/>
-            </a:pPr>
-            <a:r>
-              <a:rPr lang="en-CA" dirty="0"/>
-              <a:t>Unzip workshop file</a:t>
-            </a:r>
-          </a:p>
-          <a:p>
-            <a:pPr marL="514350" indent="-514350">
-              <a:buAutoNum type="arabicPeriod"/>
-            </a:pPr>
-            <a:r>
-              <a:rPr lang="en-CA" dirty="0"/>
-              <a:t>In HTML of tutorial for Day 1</a:t>
-            </a:r>
-          </a:p>
-          <a:p>
-            <a:pPr marL="514350" indent="-514350">
-              <a:buAutoNum type="arabicPeriod"/>
-            </a:pPr>
-            <a:endParaRPr lang="en-CA" dirty="0"/>
-          </a:p>
-          <a:p>
-            <a:pPr marL="514350" indent="-514350">
-              <a:buAutoNum type="arabicPeriod"/>
-            </a:pPr>
-            <a:endParaRPr lang="en-US" dirty="0"/>
-          </a:p>
-        </p:txBody>
-      </p:sp>
-      <p:sp>
-        <p:nvSpPr>
-          <p:cNvPr id="3" name="Slide Number Placeholder 2">
-            <a:extLst>
-              <a:ext uri="{FF2B5EF4-FFF2-40B4-BE49-F238E27FC236}">
-                <a16:creationId xmlns:a16="http://schemas.microsoft.com/office/drawing/2014/main" id="{E86981B5-CB08-49DF-8D72-6AB5B34C700A}"/>
-              </a:ext>
-            </a:extLst>
-          </p:cNvPr>
-          <p:cNvSpPr>
-            <a:spLocks noGrp="1"/>
-          </p:cNvSpPr>
-          <p:nvPr>
-            <p:ph type="sldNum" sz="quarter" idx="12"/>
-          </p:nvPr>
-        </p:nvSpPr>
-        <p:spPr/>
-        <p:txBody>
-          <a:bodyPr/>
-          <a:lstStyle/>
-          <a:p>
-            <a:fld id="{E50A8D5F-7A10-4D19-B2BD-04FE5CA3B31F}" type="slidenum">
-              <a:rPr lang="en-US" smtClean="0"/>
-              <a:pPr/>
-              <a:t>3</a:t>
-            </a:fld>
-            <a:endParaRPr lang="en-US" dirty="0"/>
-          </a:p>
-        </p:txBody>
-      </p:sp>
-      <p:sp>
-        <p:nvSpPr>
-          <p:cNvPr id="4" name="Title 3">
-            <a:extLst>
-              <a:ext uri="{FF2B5EF4-FFF2-40B4-BE49-F238E27FC236}">
-                <a16:creationId xmlns:a16="http://schemas.microsoft.com/office/drawing/2014/main" id="{1315864D-DFFC-436D-84CD-3FE4AE1832A5}"/>
-              </a:ext>
-            </a:extLst>
-          </p:cNvPr>
-          <p:cNvSpPr>
-            <a:spLocks noGrp="1"/>
-          </p:cNvSpPr>
-          <p:nvPr>
-            <p:ph type="title"/>
-          </p:nvPr>
-        </p:nvSpPr>
-        <p:spPr/>
-        <p:txBody>
-          <a:bodyPr/>
-          <a:lstStyle/>
-          <a:p>
-            <a:r>
-              <a:rPr lang="en-CA" dirty="0"/>
-              <a:t>Tutorial setup</a:t>
-            </a:r>
-            <a:endParaRPr lang="en-US" dirty="0"/>
-          </a:p>
-        </p:txBody>
-      </p:sp>
-      <p:sp>
-        <p:nvSpPr>
-          <p:cNvPr id="8" name="Oval 7">
-            <a:extLst>
-              <a:ext uri="{FF2B5EF4-FFF2-40B4-BE49-F238E27FC236}">
-                <a16:creationId xmlns:a16="http://schemas.microsoft.com/office/drawing/2014/main" id="{E0AE6E76-753B-4075-AF5E-C2FCB74E3964}"/>
-              </a:ext>
-            </a:extLst>
-          </p:cNvPr>
-          <p:cNvSpPr/>
-          <p:nvPr/>
-        </p:nvSpPr>
-        <p:spPr>
-          <a:xfrm>
-            <a:off x="7517570" y="3450243"/>
+            <a:off x="8378937" y="3475513"/>
             <a:ext cx="1596044" cy="433768"/>
           </a:xfrm>
           <a:prstGeom prst="ellipse">
@@ -4555,7 +6009,7 @@
     </p:spTree>
     <p:extLst>
       <p:ext uri="{BB962C8B-B14F-4D97-AF65-F5344CB8AC3E}">
-        <p14:creationId xmlns:p14="http://schemas.microsoft.com/office/powerpoint/2010/main" val="1945918781"/>
+        <p14:creationId xmlns:p14="http://schemas.microsoft.com/office/powerpoint/2010/main" val="2065456173"/>
       </p:ext>
     </p:extLst>
   </p:cSld>
@@ -4582,12 +6036,139 @@
           <a:chExt cx="0" cy="0"/>
         </a:xfrm>
       </p:grpSpPr>
+      <p:sp>
+        <p:nvSpPr>
+          <p:cNvPr id="2" name="Content Placeholder 1">
+            <a:extLst>
+              <a:ext uri="{FF2B5EF4-FFF2-40B4-BE49-F238E27FC236}">
+                <a16:creationId xmlns:a16="http://schemas.microsoft.com/office/drawing/2014/main" id="{5A592B84-F81F-4694-A26A-E3215D232023}"/>
+              </a:ext>
+            </a:extLst>
+          </p:cNvPr>
+          <p:cNvSpPr>
+            <a:spLocks noGrp="1"/>
+          </p:cNvSpPr>
+          <p:nvPr>
+            <p:ph idx="1"/>
+          </p:nvPr>
+        </p:nvSpPr>
+        <p:spPr>
+          <a:xfrm>
+            <a:off x="623948" y="1431144"/>
+            <a:ext cx="5327242" cy="4726088"/>
+          </a:xfrm>
+        </p:spPr>
+        <p:txBody>
+          <a:bodyPr/>
+          <a:lstStyle/>
+          <a:p>
+            <a:pPr marL="514350" indent="-514350">
+              <a:buFont typeface="Quicksand" panose="02070303000000060000" pitchFamily="18" charset="0"/>
+              <a:buAutoNum type="arabicPeriod"/>
+            </a:pPr>
+            <a:r>
+              <a:rPr lang="en-CA" dirty="0"/>
+              <a:t>Download workshop ZIP</a:t>
+            </a:r>
+          </a:p>
+          <a:p>
+            <a:pPr marL="514350" indent="-514350">
+              <a:buAutoNum type="arabicPeriod"/>
+            </a:pPr>
+            <a:r>
+              <a:rPr lang="en-CA" dirty="0"/>
+              <a:t>Unzip workshop file</a:t>
+            </a:r>
+          </a:p>
+          <a:p>
+            <a:pPr marL="514350" indent="-514350">
+              <a:buFont typeface="Quicksand" panose="02070303000000060000" pitchFamily="18" charset="0"/>
+              <a:buAutoNum type="arabicPeriod"/>
+            </a:pPr>
+            <a:r>
+              <a:rPr lang="en-CA" dirty="0"/>
+              <a:t>Open R and set the working directory to the “Day1” folder</a:t>
+            </a:r>
+          </a:p>
+          <a:p>
+            <a:pPr marL="514350" indent="-514350">
+              <a:buAutoNum type="arabicPeriod"/>
+            </a:pPr>
+            <a:endParaRPr lang="en-CA" dirty="0"/>
+          </a:p>
+          <a:p>
+            <a:pPr marL="514350" indent="-514350">
+              <a:buAutoNum type="arabicPeriod"/>
+            </a:pPr>
+            <a:endParaRPr lang="en-US" dirty="0"/>
+          </a:p>
+        </p:txBody>
+      </p:sp>
+      <p:sp>
+        <p:nvSpPr>
+          <p:cNvPr id="3" name="Slide Number Placeholder 2">
+            <a:extLst>
+              <a:ext uri="{FF2B5EF4-FFF2-40B4-BE49-F238E27FC236}">
+                <a16:creationId xmlns:a16="http://schemas.microsoft.com/office/drawing/2014/main" id="{E86981B5-CB08-49DF-8D72-6AB5B34C700A}"/>
+              </a:ext>
+            </a:extLst>
+          </p:cNvPr>
+          <p:cNvSpPr>
+            <a:spLocks noGrp="1"/>
+          </p:cNvSpPr>
+          <p:nvPr>
+            <p:ph type="sldNum" sz="quarter" idx="12"/>
+          </p:nvPr>
+        </p:nvSpPr>
+        <p:spPr/>
+        <p:txBody>
+          <a:bodyPr/>
+          <a:lstStyle/>
+          <a:p>
+            <a:fld id="{E50A8D5F-7A10-4D19-B2BD-04FE5CA3B31F}" type="slidenum">
+              <a:rPr lang="en-US" smtClean="0"/>
+              <a:pPr/>
+              <a:t>4</a:t>
+            </a:fld>
+            <a:endParaRPr lang="en-US" dirty="0"/>
+          </a:p>
+        </p:txBody>
+      </p:sp>
+      <p:sp>
+        <p:nvSpPr>
+          <p:cNvPr id="4" name="Title 3">
+            <a:extLst>
+              <a:ext uri="{FF2B5EF4-FFF2-40B4-BE49-F238E27FC236}">
+                <a16:creationId xmlns:a16="http://schemas.microsoft.com/office/drawing/2014/main" id="{1315864D-DFFC-436D-84CD-3FE4AE1832A5}"/>
+              </a:ext>
+            </a:extLst>
+          </p:cNvPr>
+          <p:cNvSpPr>
+            <a:spLocks noGrp="1"/>
+          </p:cNvSpPr>
+          <p:nvPr>
+            <p:ph type="title"/>
+          </p:nvPr>
+        </p:nvSpPr>
+        <p:spPr/>
+        <p:txBody>
+          <a:bodyPr/>
+          <a:lstStyle/>
+          <a:p>
+            <a:r>
+              <a:rPr lang="en-CA" dirty="0"/>
+              <a:t>Tutorial setup</a:t>
+            </a:r>
+            <a:endParaRPr lang="en-US" dirty="0"/>
+          </a:p>
+        </p:txBody>
+      </p:sp>
       <p:pic>
         <p:nvPicPr>
           <p:cNvPr id="5" name="Picture 4">
             <a:extLst>
               <a:ext uri="{FF2B5EF4-FFF2-40B4-BE49-F238E27FC236}">
-                <a16:creationId xmlns:a16="http://schemas.microsoft.com/office/drawing/2014/main" id="{886229C9-364C-4280-9F81-90D0984C6C66}"/>
+                <a16:creationId xmlns:a16="http://schemas.microsoft.com/office/drawing/2014/main" id="{9A815E1A-0481-4FAB-8B87-C170A379E416}"/>
               </a:ext>
             </a:extLst>
           </p:cNvPr>
@@ -4604,8 +6185,8 @@
         </p:blipFill>
         <p:spPr>
           <a:xfrm>
-            <a:off x="6190210" y="4015386"/>
-            <a:ext cx="3366183" cy="697654"/>
+            <a:off x="1208340" y="3429001"/>
+            <a:ext cx="10064944" cy="3270920"/>
           </a:xfrm>
           <a:prstGeom prst="rect">
             <a:avLst/>
@@ -4614,157 +6195,140 @@
       </p:pic>
       <p:sp>
         <p:nvSpPr>
-          <p:cNvPr id="2" name="Content Placeholder 1">
-            <a:extLst>
-              <a:ext uri="{FF2B5EF4-FFF2-40B4-BE49-F238E27FC236}">
-                <a16:creationId xmlns:a16="http://schemas.microsoft.com/office/drawing/2014/main" id="{5A592B84-F81F-4694-A26A-E3215D232023}"/>
-              </a:ext>
-            </a:extLst>
-          </p:cNvPr>
-          <p:cNvSpPr>
-            <a:spLocks noGrp="1"/>
-          </p:cNvSpPr>
-          <p:nvPr>
-            <p:ph idx="1"/>
-          </p:nvPr>
+          <p:cNvPr id="6" name="Freeform: Shape 5">
+            <a:extLst>
+              <a:ext uri="{FF2B5EF4-FFF2-40B4-BE49-F238E27FC236}">
+                <a16:creationId xmlns:a16="http://schemas.microsoft.com/office/drawing/2014/main" id="{3550D6F9-3761-421E-AFEF-6A8ACD43F949}"/>
+              </a:ext>
+            </a:extLst>
+          </p:cNvPr>
+          <p:cNvSpPr/>
+          <p:nvPr/>
         </p:nvSpPr>
         <p:spPr>
           <a:xfrm>
-            <a:off x="623948" y="1431144"/>
-            <a:ext cx="4628152" cy="4726088"/>
+            <a:off x="5943600" y="4251158"/>
+            <a:ext cx="1379621" cy="1732547"/>
           </a:xfrm>
+          <a:custGeom>
+            <a:avLst/>
+            <a:gdLst>
+              <a:gd name="connsiteX0" fmla="*/ 0 w 1315453"/>
+              <a:gd name="connsiteY0" fmla="*/ 31488 h 1756014"/>
+              <a:gd name="connsiteX1" fmla="*/ 810127 w 1315453"/>
+              <a:gd name="connsiteY1" fmla="*/ 232014 h 1756014"/>
+              <a:gd name="connsiteX2" fmla="*/ 1315453 w 1315453"/>
+              <a:gd name="connsiteY2" fmla="*/ 1756014 h 1756014"/>
+              <a:gd name="connsiteX0" fmla="*/ 0 w 1315453"/>
+              <a:gd name="connsiteY0" fmla="*/ 4013 h 1728539"/>
+              <a:gd name="connsiteX1" fmla="*/ 1034716 w 1315453"/>
+              <a:gd name="connsiteY1" fmla="*/ 565487 h 1728539"/>
+              <a:gd name="connsiteX2" fmla="*/ 1315453 w 1315453"/>
+              <a:gd name="connsiteY2" fmla="*/ 1728539 h 1728539"/>
+              <a:gd name="connsiteX0" fmla="*/ 0 w 1315453"/>
+              <a:gd name="connsiteY0" fmla="*/ 4194 h 1728720"/>
+              <a:gd name="connsiteX1" fmla="*/ 1034716 w 1315453"/>
+              <a:gd name="connsiteY1" fmla="*/ 565668 h 1728720"/>
+              <a:gd name="connsiteX2" fmla="*/ 1315453 w 1315453"/>
+              <a:gd name="connsiteY2" fmla="*/ 1728720 h 1728720"/>
+              <a:gd name="connsiteX0" fmla="*/ 0 w 1315453"/>
+              <a:gd name="connsiteY0" fmla="*/ 4013 h 1728539"/>
+              <a:gd name="connsiteX1" fmla="*/ 1034716 w 1315453"/>
+              <a:gd name="connsiteY1" fmla="*/ 565487 h 1728539"/>
+              <a:gd name="connsiteX2" fmla="*/ 1315453 w 1315453"/>
+              <a:gd name="connsiteY2" fmla="*/ 1728539 h 1728539"/>
+              <a:gd name="connsiteX0" fmla="*/ 0 w 1315453"/>
+              <a:gd name="connsiteY0" fmla="*/ 4013 h 1728539"/>
+              <a:gd name="connsiteX1" fmla="*/ 1034716 w 1315453"/>
+              <a:gd name="connsiteY1" fmla="*/ 565487 h 1728539"/>
+              <a:gd name="connsiteX2" fmla="*/ 1315453 w 1315453"/>
+              <a:gd name="connsiteY2" fmla="*/ 1728539 h 1728539"/>
+              <a:gd name="connsiteX0" fmla="*/ 0 w 1379621"/>
+              <a:gd name="connsiteY0" fmla="*/ 3938 h 1736485"/>
+              <a:gd name="connsiteX1" fmla="*/ 1098884 w 1379621"/>
+              <a:gd name="connsiteY1" fmla="*/ 573433 h 1736485"/>
+              <a:gd name="connsiteX2" fmla="*/ 1379621 w 1379621"/>
+              <a:gd name="connsiteY2" fmla="*/ 1736485 h 1736485"/>
+              <a:gd name="connsiteX0" fmla="*/ 0 w 1379621"/>
+              <a:gd name="connsiteY0" fmla="*/ 0 h 1732547"/>
+              <a:gd name="connsiteX1" fmla="*/ 1098884 w 1379621"/>
+              <a:gd name="connsiteY1" fmla="*/ 569495 h 1732547"/>
+              <a:gd name="connsiteX2" fmla="*/ 1379621 w 1379621"/>
+              <a:gd name="connsiteY2" fmla="*/ 1732547 h 1732547"/>
+              <a:gd name="connsiteX0" fmla="*/ 0 w 1379621"/>
+              <a:gd name="connsiteY0" fmla="*/ 0 h 1732547"/>
+              <a:gd name="connsiteX1" fmla="*/ 1379621 w 1379621"/>
+              <a:gd name="connsiteY1" fmla="*/ 1732547 h 1732547"/>
+              <a:gd name="connsiteX0" fmla="*/ 0 w 1379621"/>
+              <a:gd name="connsiteY0" fmla="*/ 0 h 1732547"/>
+              <a:gd name="connsiteX1" fmla="*/ 1379621 w 1379621"/>
+              <a:gd name="connsiteY1" fmla="*/ 1732547 h 1732547"/>
+              <a:gd name="connsiteX0" fmla="*/ 0 w 1379621"/>
+              <a:gd name="connsiteY0" fmla="*/ 0 h 1732547"/>
+              <a:gd name="connsiteX1" fmla="*/ 1379621 w 1379621"/>
+              <a:gd name="connsiteY1" fmla="*/ 1732547 h 1732547"/>
+            </a:gdLst>
+            <a:ahLst/>
+            <a:cxnLst>
+              <a:cxn ang="0">
+                <a:pos x="connsiteX0" y="connsiteY0"/>
+              </a:cxn>
+              <a:cxn ang="0">
+                <a:pos x="connsiteX1" y="connsiteY1"/>
+              </a:cxn>
+            </a:cxnLst>
+            <a:rect l="l" t="t" r="r" b="b"/>
+            <a:pathLst>
+              <a:path w="1379621" h="1732547">
+                <a:moveTo>
+                  <a:pt x="0" y="0"/>
+                </a:moveTo>
+                <a:cubicBezTo>
+                  <a:pt x="1213853" y="1"/>
+                  <a:pt x="1376947" y="1090863"/>
+                  <a:pt x="1379621" y="1732547"/>
+                </a:cubicBezTo>
+              </a:path>
+            </a:pathLst>
+          </a:custGeom>
+          <a:noFill/>
+          <a:ln w="38100">
+            <a:solidFill>
+              <a:srgbClr val="FF0000"/>
+            </a:solidFill>
+            <a:headEnd type="none" w="med" len="med"/>
+            <a:tailEnd type="triangle" w="med" len="med"/>
+          </a:ln>
         </p:spPr>
-        <p:txBody>
-          <a:bodyPr/>
+        <p:style>
+          <a:lnRef idx="2">
+            <a:schemeClr val="accent1">
+              <a:shade val="50000"/>
+            </a:schemeClr>
+          </a:lnRef>
+          <a:fillRef idx="1">
+            <a:schemeClr val="accent1"/>
+          </a:fillRef>
+          <a:effectRef idx="0">
+            <a:schemeClr val="accent1"/>
+          </a:effectRef>
+          <a:fontRef idx="minor">
+            <a:schemeClr val="lt1"/>
+          </a:fontRef>
+        </p:style>
+        <p:txBody>
+          <a:bodyPr rtlCol="0" anchor="ctr"/>
           <a:lstStyle/>
           <a:p>
-            <a:pPr marL="514350" indent="-514350">
-              <a:buAutoNum type="arabicPeriod"/>
-            </a:pPr>
-            <a:r>
-              <a:rPr lang="en-CA" dirty="0"/>
-              <a:t>Unzip workshop file</a:t>
-            </a:r>
-          </a:p>
-          <a:p>
-            <a:pPr marL="514350" indent="-514350">
-              <a:buAutoNum type="arabicPeriod"/>
-            </a:pPr>
-            <a:r>
-              <a:rPr lang="en-CA" dirty="0"/>
-              <a:t>In R, open tutorial for Day 1</a:t>
-            </a:r>
-          </a:p>
-          <a:p>
-            <a:pPr marL="514350" indent="-514350">
-              <a:buAutoNum type="arabicPeriod"/>
-            </a:pPr>
-            <a:r>
-              <a:rPr lang="en-CA" dirty="0"/>
-              <a:t>Set </a:t>
-            </a:r>
-            <a:r>
-              <a:rPr lang="en-CA" dirty="0" err="1"/>
-              <a:t>workind</a:t>
-            </a:r>
-            <a:r>
-              <a:rPr lang="en-CA" dirty="0"/>
-              <a:t> directory with:  </a:t>
-            </a:r>
-            <a:r>
-              <a:rPr lang="en-CA" dirty="0" err="1">
-                <a:latin typeface="Courier New" panose="02070309020205020404" pitchFamily="49" charset="0"/>
-                <a:ea typeface="CMU Typewriter Text Variable Wi" panose="02000603000000000000" pitchFamily="2" charset="0"/>
-                <a:cs typeface="Courier New" panose="02070309020205020404" pitchFamily="49" charset="0"/>
-              </a:rPr>
-              <a:t>setwd</a:t>
-            </a:r>
-            <a:r>
-              <a:rPr lang="en-CA" dirty="0">
-                <a:latin typeface="Courier New" panose="02070309020205020404" pitchFamily="49" charset="0"/>
-                <a:ea typeface="CMU Typewriter Text Variable Wi" panose="02000603000000000000" pitchFamily="2" charset="0"/>
-                <a:cs typeface="Courier New" panose="02070309020205020404" pitchFamily="49" charset="0"/>
-              </a:rPr>
-              <a:t>(“Day1/”)</a:t>
-            </a:r>
-          </a:p>
-          <a:p>
-            <a:pPr marL="514350" indent="-514350">
-              <a:buAutoNum type="arabicPeriod"/>
-            </a:pPr>
-            <a:endParaRPr lang="en-CA" dirty="0"/>
-          </a:p>
-          <a:p>
-            <a:pPr marL="514350" indent="-514350">
-              <a:buAutoNum type="arabicPeriod"/>
-            </a:pPr>
-            <a:endParaRPr lang="en-US" dirty="0"/>
-          </a:p>
-        </p:txBody>
-      </p:sp>
-      <p:sp>
-        <p:nvSpPr>
-          <p:cNvPr id="3" name="Slide Number Placeholder 2">
-            <a:extLst>
-              <a:ext uri="{FF2B5EF4-FFF2-40B4-BE49-F238E27FC236}">
-                <a16:creationId xmlns:a16="http://schemas.microsoft.com/office/drawing/2014/main" id="{E86981B5-CB08-49DF-8D72-6AB5B34C700A}"/>
-              </a:ext>
-            </a:extLst>
-          </p:cNvPr>
-          <p:cNvSpPr>
-            <a:spLocks noGrp="1"/>
-          </p:cNvSpPr>
-          <p:nvPr>
-            <p:ph type="sldNum" sz="quarter" idx="12"/>
-          </p:nvPr>
-        </p:nvSpPr>
-        <p:spPr/>
-        <p:txBody>
-          <a:bodyPr/>
-          <a:lstStyle/>
-          <a:p>
-            <a:fld id="{E50A8D5F-7A10-4D19-B2BD-04FE5CA3B31F}" type="slidenum">
-              <a:rPr lang="en-US" smtClean="0"/>
-              <a:pPr/>
-              <a:t>4</a:t>
-            </a:fld>
-            <a:endParaRPr lang="en-US" dirty="0"/>
-          </a:p>
-        </p:txBody>
-      </p:sp>
-      <p:sp>
-        <p:nvSpPr>
-          <p:cNvPr id="4" name="Title 3">
-            <a:extLst>
-              <a:ext uri="{FF2B5EF4-FFF2-40B4-BE49-F238E27FC236}">
-                <a16:creationId xmlns:a16="http://schemas.microsoft.com/office/drawing/2014/main" id="{1315864D-DFFC-436D-84CD-3FE4AE1832A5}"/>
-              </a:ext>
-            </a:extLst>
-          </p:cNvPr>
-          <p:cNvSpPr>
-            <a:spLocks noGrp="1"/>
-          </p:cNvSpPr>
-          <p:nvPr>
-            <p:ph type="title"/>
-          </p:nvPr>
-        </p:nvSpPr>
-        <p:spPr/>
-        <p:txBody>
-          <a:bodyPr/>
-          <a:lstStyle/>
-          <a:p>
-            <a:r>
-              <a:rPr lang="en-CA" dirty="0"/>
-              <a:t>Tutorial setup</a:t>
-            </a:r>
-            <a:endParaRPr lang="en-US" dirty="0"/>
+            <a:pPr algn="ctr"/>
+            <a:endParaRPr lang="en-US"/>
           </a:p>
         </p:txBody>
       </p:sp>
     </p:spTree>
     <p:extLst>
       <p:ext uri="{BB962C8B-B14F-4D97-AF65-F5344CB8AC3E}">
-        <p14:creationId xmlns:p14="http://schemas.microsoft.com/office/powerpoint/2010/main" val="1206867271"/>
+        <p14:creationId xmlns:p14="http://schemas.microsoft.com/office/powerpoint/2010/main" val="1945918781"/>
       </p:ext>
     </p:extLst>
   </p:cSld>
@@ -4791,12 +6355,42 @@
           <a:chExt cx="0" cy="0"/>
         </a:xfrm>
       </p:grpSpPr>
+      <p:pic>
+        <p:nvPicPr>
+          <p:cNvPr id="9" name="Picture 8">
+            <a:extLst>
+              <a:ext uri="{FF2B5EF4-FFF2-40B4-BE49-F238E27FC236}">
+                <a16:creationId xmlns:a16="http://schemas.microsoft.com/office/drawing/2014/main" id="{4EC5381F-6DED-4F56-B18F-058B09999251}"/>
+              </a:ext>
+            </a:extLst>
+          </p:cNvPr>
+          <p:cNvPicPr>
+            <a:picLocks noChangeAspect="1"/>
+          </p:cNvPicPr>
+          <p:nvPr/>
+        </p:nvPicPr>
+        <p:blipFill>
+          <a:blip r:embed="rId2"/>
+          <a:stretch>
+            <a:fillRect/>
+          </a:stretch>
+        </p:blipFill>
+        <p:spPr>
+          <a:xfrm>
+            <a:off x="5951190" y="471470"/>
+            <a:ext cx="5451540" cy="5736034"/>
+          </a:xfrm>
+          <a:prstGeom prst="rect">
+            <a:avLst/>
+          </a:prstGeom>
+        </p:spPr>
+      </p:pic>
       <p:sp>
         <p:nvSpPr>
           <p:cNvPr id="2" name="Content Placeholder 1">
             <a:extLst>
               <a:ext uri="{FF2B5EF4-FFF2-40B4-BE49-F238E27FC236}">
-                <a16:creationId xmlns:a16="http://schemas.microsoft.com/office/drawing/2014/main" id="{1E1A1114-2E5A-4722-88B2-814987517B10}"/>
+                <a16:creationId xmlns:a16="http://schemas.microsoft.com/office/drawing/2014/main" id="{5A592B84-F81F-4694-A26A-E3215D232023}"/>
               </a:ext>
             </a:extLst>
           </p:cNvPr>
@@ -4807,58 +6401,57 @@
             <p:ph idx="1"/>
           </p:nvPr>
         </p:nvSpPr>
-        <p:spPr/>
+        <p:spPr>
+          <a:xfrm>
+            <a:off x="623948" y="1431144"/>
+            <a:ext cx="5327242" cy="4726088"/>
+          </a:xfrm>
+        </p:spPr>
         <p:txBody>
           <a:bodyPr/>
           <a:lstStyle/>
           <a:p>
+            <a:pPr marL="514350" indent="-514350">
+              <a:buFont typeface="Quicksand" panose="02070303000000060000" pitchFamily="18" charset="0"/>
+              <a:buAutoNum type="arabicPeriod"/>
+            </a:pPr>
             <a:r>
               <a:rPr lang="en-CA" dirty="0"/>
-              <a:t>Introduction to </a:t>
-            </a:r>
-            <a:r>
-              <a:rPr lang="en-CA" dirty="0" err="1">
-                <a:latin typeface="Courier New" panose="02070309020205020404" pitchFamily="49" charset="0"/>
-                <a:cs typeface="Courier New" panose="02070309020205020404" pitchFamily="49" charset="0"/>
-              </a:rPr>
-              <a:t>momentuHMM</a:t>
-            </a:r>
+              <a:t>Download workshop ZIP</a:t>
+            </a:r>
+          </a:p>
+          <a:p>
+            <a:pPr marL="514350" indent="-514350">
+              <a:buAutoNum type="arabicPeriod"/>
+            </a:pPr>
             <a:r>
               <a:rPr lang="en-CA" dirty="0"/>
-              <a:t> </a:t>
-            </a:r>
-          </a:p>
-          <a:p>
+              <a:t>Unzip workshop file</a:t>
+            </a:r>
+          </a:p>
+          <a:p>
+            <a:pPr marL="514350" indent="-514350">
+              <a:buFont typeface="Quicksand" panose="02070303000000060000" pitchFamily="18" charset="0"/>
+              <a:buAutoNum type="arabicPeriod"/>
+            </a:pPr>
             <a:r>
               <a:rPr lang="en-CA" dirty="0"/>
-              <a:t>Fit basic HMM to GPS data from grey seal</a:t>
-            </a:r>
-          </a:p>
-          <a:p>
+              <a:t>Open R and set the working directory to the “Day1” folder</a:t>
+            </a:r>
+          </a:p>
+          <a:p>
+            <a:pPr marL="514350" indent="-514350">
+              <a:buAutoNum type="arabicPeriod"/>
+            </a:pPr>
             <a:r>
               <a:rPr lang="en-CA" dirty="0"/>
-              <a:t>Assessing model fit and quality</a:t>
-            </a:r>
-          </a:p>
-          <a:p>
-            <a:r>
-              <a:rPr lang="en-CA" dirty="0"/>
-              <a:t>Troubleshooting failed models </a:t>
-            </a:r>
-          </a:p>
-          <a:p>
-            <a:r>
-              <a:rPr lang="en-CA" dirty="0"/>
-              <a:t>Simulating tracks from fit HMMs</a:t>
-            </a:r>
-          </a:p>
-          <a:p>
-            <a:r>
-              <a:rPr lang="en-CA" dirty="0"/>
-              <a:t>Integrating covariates on transition probability</a:t>
-            </a:r>
-          </a:p>
-          <a:p>
+              <a:t>Follow along with the Day 1 HTML tutorial</a:t>
+            </a:r>
+          </a:p>
+          <a:p>
+            <a:pPr marL="514350" indent="-514350">
+              <a:buAutoNum type="arabicPeriod"/>
+            </a:pPr>
             <a:endParaRPr lang="en-US" dirty="0"/>
           </a:p>
         </p:txBody>
@@ -4868,7 +6461,7 @@
           <p:cNvPr id="3" name="Slide Number Placeholder 2">
             <a:extLst>
               <a:ext uri="{FF2B5EF4-FFF2-40B4-BE49-F238E27FC236}">
-                <a16:creationId xmlns:a16="http://schemas.microsoft.com/office/drawing/2014/main" id="{5A5F0C69-7C98-4366-8D2A-818CC320EE28}"/>
+                <a16:creationId xmlns:a16="http://schemas.microsoft.com/office/drawing/2014/main" id="{E86981B5-CB08-49DF-8D72-6AB5B34C700A}"/>
               </a:ext>
             </a:extLst>
           </p:cNvPr>
@@ -4898,7 +6491,7 @@
           <p:cNvPr id="4" name="Title 3">
             <a:extLst>
               <a:ext uri="{FF2B5EF4-FFF2-40B4-BE49-F238E27FC236}">
-                <a16:creationId xmlns:a16="http://schemas.microsoft.com/office/drawing/2014/main" id="{A23E76A1-B134-45BF-B6B7-76ECDC3F2250}"/>
+                <a16:creationId xmlns:a16="http://schemas.microsoft.com/office/drawing/2014/main" id="{1315864D-DFFC-436D-84CD-3FE4AE1832A5}"/>
               </a:ext>
             </a:extLst>
           </p:cNvPr>
@@ -4916,16 +6509,62 @@
           <a:p>
             <a:r>
               <a:rPr lang="en-CA" dirty="0"/>
-              <a:t>Day 1 Objectives </a:t>
+              <a:t>Tutorial setup</a:t>
             </a:r>
             <a:endParaRPr lang="en-US" dirty="0"/>
+          </a:p>
+        </p:txBody>
+      </p:sp>
+      <p:sp>
+        <p:nvSpPr>
+          <p:cNvPr id="8" name="Oval 7">
+            <a:extLst>
+              <a:ext uri="{FF2B5EF4-FFF2-40B4-BE49-F238E27FC236}">
+                <a16:creationId xmlns:a16="http://schemas.microsoft.com/office/drawing/2014/main" id="{E0AE6E76-753B-4075-AF5E-C2FCB74E3964}"/>
+              </a:ext>
+            </a:extLst>
+          </p:cNvPr>
+          <p:cNvSpPr/>
+          <p:nvPr/>
+        </p:nvSpPr>
+        <p:spPr>
+          <a:xfrm>
+            <a:off x="7517570" y="3450243"/>
+            <a:ext cx="1596044" cy="433768"/>
+          </a:xfrm>
+          <a:prstGeom prst="ellipse">
+            <a:avLst/>
+          </a:prstGeom>
+          <a:noFill/>
+          <a:ln w="38100"/>
+        </p:spPr>
+        <p:style>
+          <a:lnRef idx="2">
+            <a:schemeClr val="accent2"/>
+          </a:lnRef>
+          <a:fillRef idx="1">
+            <a:schemeClr val="lt1"/>
+          </a:fillRef>
+          <a:effectRef idx="0">
+            <a:schemeClr val="accent2"/>
+          </a:effectRef>
+          <a:fontRef idx="minor">
+            <a:schemeClr val="dk1"/>
+          </a:fontRef>
+        </p:style>
+        <p:txBody>
+          <a:bodyPr rtlCol="0" anchor="ctr"/>
+          <a:lstStyle/>
+          <a:p>
+            <a:pPr algn="ctr"/>
+            <a:endParaRPr lang="en-US"/>
           </a:p>
         </p:txBody>
       </p:sp>
     </p:spTree>
     <p:extLst>
       <p:ext uri="{BB962C8B-B14F-4D97-AF65-F5344CB8AC3E}">
-        <p14:creationId xmlns:p14="http://schemas.microsoft.com/office/powerpoint/2010/main" val="1299182405"/>
+        <p14:creationId xmlns:p14="http://schemas.microsoft.com/office/powerpoint/2010/main" val="846823073"/>
       </p:ext>
     </p:extLst>
   </p:cSld>
@@ -4957,7 +6596,7 @@
           <p:cNvPr id="2" name="Content Placeholder 1">
             <a:extLst>
               <a:ext uri="{FF2B5EF4-FFF2-40B4-BE49-F238E27FC236}">
-                <a16:creationId xmlns:a16="http://schemas.microsoft.com/office/drawing/2014/main" id="{EC8489D7-F512-40C5-87F1-DE10D154B2D8}"/>
+                <a16:creationId xmlns:a16="http://schemas.microsoft.com/office/drawing/2014/main" id="{1E1A1114-2E5A-4722-88B2-814987517B10}"/>
               </a:ext>
             </a:extLst>
           </p:cNvPr>
@@ -4973,84 +6612,83 @@
           <a:bodyPr/>
           <a:lstStyle/>
           <a:p>
+            <a:pPr marL="514350" indent="-514350">
+              <a:buFont typeface="+mj-lt"/>
+              <a:buAutoNum type="arabicPeriod"/>
+            </a:pPr>
             <a:r>
               <a:rPr lang="en-CA" dirty="0"/>
-              <a:t>Package by Brett McClintock and </a:t>
-            </a:r>
-            <a:r>
-              <a:rPr lang="en-CA" dirty="0" err="1"/>
-              <a:t>Théo</a:t>
+              <a:t>Fit basic HMM to GPS data from grey seal</a:t>
+            </a:r>
+          </a:p>
+          <a:p>
+            <a:pPr marL="514350" indent="-514350">
+              <a:buFont typeface="+mj-lt"/>
+              <a:buAutoNum type="arabicPeriod"/>
+            </a:pPr>
+            <a:r>
+              <a:rPr lang="en-CA" dirty="0"/>
+              <a:t>Introduction fitting models with </a:t>
+            </a:r>
+            <a:r>
+              <a:rPr lang="en-CA" dirty="0" err="1">
+                <a:solidFill>
+                  <a:schemeClr val="bg2">
+                    <a:lumMod val="10000"/>
+                  </a:schemeClr>
+                </a:solidFill>
+                <a:latin typeface="Lucida Console" panose="020B0609040504020204" pitchFamily="49" charset="0"/>
+                <a:cs typeface="Courier New" panose="02070309020205020404" pitchFamily="49" charset="0"/>
+              </a:rPr>
+              <a:t>momentuHMM</a:t>
             </a:r>
             <a:r>
               <a:rPr lang="en-CA" dirty="0"/>
               <a:t> </a:t>
             </a:r>
-            <a:r>
-              <a:rPr lang="en-CA" dirty="0" err="1"/>
-              <a:t>Michelot</a:t>
-            </a:r>
+          </a:p>
+          <a:p>
+            <a:pPr marL="514350" indent="-514350">
+              <a:buFont typeface="+mj-lt"/>
+              <a:buAutoNum type="arabicPeriod"/>
+            </a:pPr>
             <a:r>
               <a:rPr lang="en-CA" dirty="0"/>
-              <a:t>, based on </a:t>
-            </a:r>
-            <a:r>
-              <a:rPr lang="en-US" dirty="0" err="1">
-                <a:latin typeface="Courier New" panose="02070309020205020404" pitchFamily="49" charset="0"/>
-                <a:cs typeface="Courier New" panose="02070309020205020404" pitchFamily="49" charset="0"/>
-              </a:rPr>
-              <a:t>moveHMM</a:t>
-            </a:r>
-            <a:endParaRPr lang="en-US" dirty="0">
-              <a:latin typeface="Courier New" panose="02070309020205020404" pitchFamily="49" charset="0"/>
-              <a:cs typeface="Courier New" panose="02070309020205020404" pitchFamily="49" charset="0"/>
-            </a:endParaRPr>
-          </a:p>
-          <a:p>
-            <a:r>
-              <a:rPr lang="en-CA" dirty="0">
-                <a:cs typeface="Courier New" panose="02070309020205020404" pitchFamily="49" charset="0"/>
-              </a:rPr>
-              <a:t>Key functions:</a:t>
-            </a:r>
-          </a:p>
-          <a:p>
-            <a:pPr lvl="1"/>
-            <a:r>
-              <a:rPr lang="en-CA" dirty="0" err="1">
-                <a:cs typeface="Courier New" panose="02070309020205020404" pitchFamily="49" charset="0"/>
-              </a:rPr>
-              <a:t>prepData</a:t>
-            </a:r>
-            <a:r>
-              <a:rPr lang="en-CA" dirty="0">
-                <a:cs typeface="Courier New" panose="02070309020205020404" pitchFamily="49" charset="0"/>
-              </a:rPr>
-              <a:t>: prepare data </a:t>
-            </a:r>
-          </a:p>
-          <a:p>
-            <a:pPr lvl="1"/>
-            <a:r>
-              <a:rPr lang="en-US" dirty="0" err="1">
-                <a:cs typeface="Courier New" panose="02070309020205020404" pitchFamily="49" charset="0"/>
-              </a:rPr>
-              <a:t>fitHMM</a:t>
-            </a:r>
-            <a:r>
-              <a:rPr lang="en-US" dirty="0">
-                <a:cs typeface="Courier New" panose="02070309020205020404" pitchFamily="49" charset="0"/>
-              </a:rPr>
-              <a:t>: fit HMM </a:t>
-            </a:r>
-          </a:p>
-          <a:p>
-            <a:pPr lvl="1"/>
-            <a:r>
-              <a:rPr lang="en-US" dirty="0">
-                <a:cs typeface="Courier New" panose="02070309020205020404" pitchFamily="49" charset="0"/>
-              </a:rPr>
-              <a:t>Viterbi: decode most likely state sequence</a:t>
-            </a:r>
+              <a:t>Assessing model fit and quality</a:t>
+            </a:r>
+          </a:p>
+          <a:p>
+            <a:pPr marL="514350" indent="-514350">
+              <a:buFont typeface="+mj-lt"/>
+              <a:buAutoNum type="arabicPeriod"/>
+            </a:pPr>
+            <a:r>
+              <a:rPr lang="en-CA" dirty="0"/>
+              <a:t>Integrating and interpreting covariates on state probability</a:t>
+            </a:r>
+          </a:p>
+          <a:p>
+            <a:pPr marL="514350" indent="-514350">
+              <a:buFont typeface="+mj-lt"/>
+              <a:buAutoNum type="arabicPeriod"/>
+            </a:pPr>
+            <a:r>
+              <a:rPr lang="en-CA" dirty="0"/>
+              <a:t>Integrate covariate on emission probability</a:t>
+            </a:r>
+          </a:p>
+          <a:p>
+            <a:pPr marL="514350" indent="-514350">
+              <a:buFont typeface="+mj-lt"/>
+              <a:buAutoNum type="arabicPeriod"/>
+            </a:pPr>
+            <a:r>
+              <a:rPr lang="en-CA" dirty="0"/>
+              <a:t>Examine effect of different temporal resolutions for track data</a:t>
+            </a:r>
+          </a:p>
+          <a:p>
+            <a:endParaRPr lang="en-US" dirty="0"/>
           </a:p>
         </p:txBody>
       </p:sp>
@@ -5059,7 +6697,7 @@
           <p:cNvPr id="3" name="Slide Number Placeholder 2">
             <a:extLst>
               <a:ext uri="{FF2B5EF4-FFF2-40B4-BE49-F238E27FC236}">
-                <a16:creationId xmlns:a16="http://schemas.microsoft.com/office/drawing/2014/main" id="{C652FC54-3760-4749-A720-9D60BB2068DA}"/>
+                <a16:creationId xmlns:a16="http://schemas.microsoft.com/office/drawing/2014/main" id="{5A5F0C69-7C98-4366-8D2A-818CC320EE28}"/>
               </a:ext>
             </a:extLst>
           </p:cNvPr>
@@ -5089,7 +6727,7 @@
           <p:cNvPr id="4" name="Title 3">
             <a:extLst>
               <a:ext uri="{FF2B5EF4-FFF2-40B4-BE49-F238E27FC236}">
-                <a16:creationId xmlns:a16="http://schemas.microsoft.com/office/drawing/2014/main" id="{16B592B6-27DA-462D-863F-E06EDBEFB08D}"/>
+                <a16:creationId xmlns:a16="http://schemas.microsoft.com/office/drawing/2014/main" id="{A23E76A1-B134-45BF-B6B7-76ECDC3F2250}"/>
               </a:ext>
             </a:extLst>
           </p:cNvPr>
@@ -5106,11 +6744,8 @@
           <a:lstStyle/>
           <a:p>
             <a:r>
-              <a:rPr lang="en-CA" dirty="0" err="1">
-                <a:latin typeface="Courier New" panose="02070309020205020404" pitchFamily="49" charset="0"/>
-                <a:cs typeface="Courier New" panose="02070309020205020404" pitchFamily="49" charset="0"/>
-              </a:rPr>
-              <a:t>momentuHMM</a:t>
+              <a:rPr lang="en-CA" dirty="0"/>
+              <a:t>Day 1 Objectives </a:t>
             </a:r>
             <a:endParaRPr lang="en-US" dirty="0"/>
           </a:p>
@@ -5119,13 +6754,412 @@
     </p:spTree>
     <p:extLst>
       <p:ext uri="{BB962C8B-B14F-4D97-AF65-F5344CB8AC3E}">
-        <p14:creationId xmlns:p14="http://schemas.microsoft.com/office/powerpoint/2010/main" val="1034678634"/>
+        <p14:creationId xmlns:p14="http://schemas.microsoft.com/office/powerpoint/2010/main" val="1299182405"/>
       </p:ext>
     </p:extLst>
   </p:cSld>
   <p:clrMapOvr>
     <a:masterClrMapping/>
   </p:clrMapOvr>
+  <p:timing>
+    <p:tnLst>
+      <p:par>
+        <p:cTn id="1" dur="indefinite" restart="never" nodeType="tmRoot">
+          <p:childTnLst>
+            <p:seq concurrent="1" nextAc="seek">
+              <p:cTn id="2" dur="indefinite" nodeType="mainSeq">
+                <p:childTnLst>
+                  <p:par>
+                    <p:cTn id="3" fill="hold">
+                      <p:stCondLst>
+                        <p:cond delay="indefinite"/>
+                      </p:stCondLst>
+                      <p:childTnLst>
+                        <p:par>
+                          <p:cTn id="4" fill="hold">
+                            <p:stCondLst>
+                              <p:cond delay="0"/>
+                            </p:stCondLst>
+                            <p:childTnLst>
+                              <p:par>
+                                <p:cTn id="5" presetID="10" presetClass="entr" presetSubtype="0" fill="hold" grpId="0" nodeType="clickEffect">
+                                  <p:stCondLst>
+                                    <p:cond delay="0"/>
+                                  </p:stCondLst>
+                                  <p:childTnLst>
+                                    <p:set>
+                                      <p:cBhvr>
+                                        <p:cTn id="6" dur="1" fill="hold">
+                                          <p:stCondLst>
+                                            <p:cond delay="0"/>
+                                          </p:stCondLst>
+                                        </p:cTn>
+                                        <p:tgtEl>
+                                          <p:spTgt spid="2">
+                                            <p:txEl>
+                                              <p:pRg st="0" end="0"/>
+                                            </p:txEl>
+                                          </p:spTgt>
+                                        </p:tgtEl>
+                                        <p:attrNameLst>
+                                          <p:attrName>style.visibility</p:attrName>
+                                        </p:attrNameLst>
+                                      </p:cBhvr>
+                                      <p:to>
+                                        <p:strVal val="visible"/>
+                                      </p:to>
+                                    </p:set>
+                                    <p:animEffect transition="in" filter="fade">
+                                      <p:cBhvr>
+                                        <p:cTn id="7" dur="500"/>
+                                        <p:tgtEl>
+                                          <p:spTgt spid="2">
+                                            <p:txEl>
+                                              <p:pRg st="0" end="0"/>
+                                            </p:txEl>
+                                          </p:spTgt>
+                                        </p:tgtEl>
+                                      </p:cBhvr>
+                                    </p:animEffect>
+                                  </p:childTnLst>
+                                </p:cTn>
+                              </p:par>
+                            </p:childTnLst>
+                          </p:cTn>
+                        </p:par>
+                      </p:childTnLst>
+                    </p:cTn>
+                  </p:par>
+                  <p:par>
+                    <p:cTn id="8" fill="hold">
+                      <p:stCondLst>
+                        <p:cond delay="indefinite"/>
+                      </p:stCondLst>
+                      <p:childTnLst>
+                        <p:par>
+                          <p:cTn id="9" fill="hold">
+                            <p:stCondLst>
+                              <p:cond delay="0"/>
+                            </p:stCondLst>
+                            <p:childTnLst>
+                              <p:par>
+                                <p:cTn id="10" presetID="10" presetClass="entr" presetSubtype="0" fill="hold" grpId="0" nodeType="clickEffect">
+                                  <p:stCondLst>
+                                    <p:cond delay="0"/>
+                                  </p:stCondLst>
+                                  <p:childTnLst>
+                                    <p:set>
+                                      <p:cBhvr>
+                                        <p:cTn id="11" dur="1" fill="hold">
+                                          <p:stCondLst>
+                                            <p:cond delay="0"/>
+                                          </p:stCondLst>
+                                        </p:cTn>
+                                        <p:tgtEl>
+                                          <p:spTgt spid="2">
+                                            <p:txEl>
+                                              <p:pRg st="1" end="1"/>
+                                            </p:txEl>
+                                          </p:spTgt>
+                                        </p:tgtEl>
+                                        <p:attrNameLst>
+                                          <p:attrName>style.visibility</p:attrName>
+                                        </p:attrNameLst>
+                                      </p:cBhvr>
+                                      <p:to>
+                                        <p:strVal val="visible"/>
+                                      </p:to>
+                                    </p:set>
+                                    <p:animEffect transition="in" filter="fade">
+                                      <p:cBhvr>
+                                        <p:cTn id="12" dur="500"/>
+                                        <p:tgtEl>
+                                          <p:spTgt spid="2">
+                                            <p:txEl>
+                                              <p:pRg st="1" end="1"/>
+                                            </p:txEl>
+                                          </p:spTgt>
+                                        </p:tgtEl>
+                                      </p:cBhvr>
+                                    </p:animEffect>
+                                  </p:childTnLst>
+                                </p:cTn>
+                              </p:par>
+                            </p:childTnLst>
+                          </p:cTn>
+                        </p:par>
+                      </p:childTnLst>
+                    </p:cTn>
+                  </p:par>
+                  <p:par>
+                    <p:cTn id="13" fill="hold">
+                      <p:stCondLst>
+                        <p:cond delay="indefinite"/>
+                      </p:stCondLst>
+                      <p:childTnLst>
+                        <p:par>
+                          <p:cTn id="14" fill="hold">
+                            <p:stCondLst>
+                              <p:cond delay="0"/>
+                            </p:stCondLst>
+                            <p:childTnLst>
+                              <p:par>
+                                <p:cTn id="15" presetID="10" presetClass="entr" presetSubtype="0" fill="hold" grpId="0" nodeType="clickEffect">
+                                  <p:stCondLst>
+                                    <p:cond delay="0"/>
+                                  </p:stCondLst>
+                                  <p:childTnLst>
+                                    <p:set>
+                                      <p:cBhvr>
+                                        <p:cTn id="16" dur="1" fill="hold">
+                                          <p:stCondLst>
+                                            <p:cond delay="0"/>
+                                          </p:stCondLst>
+                                        </p:cTn>
+                                        <p:tgtEl>
+                                          <p:spTgt spid="2">
+                                            <p:txEl>
+                                              <p:pRg st="2" end="2"/>
+                                            </p:txEl>
+                                          </p:spTgt>
+                                        </p:tgtEl>
+                                        <p:attrNameLst>
+                                          <p:attrName>style.visibility</p:attrName>
+                                        </p:attrNameLst>
+                                      </p:cBhvr>
+                                      <p:to>
+                                        <p:strVal val="visible"/>
+                                      </p:to>
+                                    </p:set>
+                                    <p:animEffect transition="in" filter="fade">
+                                      <p:cBhvr>
+                                        <p:cTn id="17" dur="500"/>
+                                        <p:tgtEl>
+                                          <p:spTgt spid="2">
+                                            <p:txEl>
+                                              <p:pRg st="2" end="2"/>
+                                            </p:txEl>
+                                          </p:spTgt>
+                                        </p:tgtEl>
+                                      </p:cBhvr>
+                                    </p:animEffect>
+                                  </p:childTnLst>
+                                </p:cTn>
+                              </p:par>
+                            </p:childTnLst>
+                          </p:cTn>
+                        </p:par>
+                      </p:childTnLst>
+                    </p:cTn>
+                  </p:par>
+                  <p:par>
+                    <p:cTn id="18" fill="hold">
+                      <p:stCondLst>
+                        <p:cond delay="indefinite"/>
+                      </p:stCondLst>
+                      <p:childTnLst>
+                        <p:par>
+                          <p:cTn id="19" fill="hold">
+                            <p:stCondLst>
+                              <p:cond delay="0"/>
+                            </p:stCondLst>
+                            <p:childTnLst>
+                              <p:par>
+                                <p:cTn id="20" presetID="10" presetClass="entr" presetSubtype="0" fill="hold" grpId="0" nodeType="clickEffect">
+                                  <p:stCondLst>
+                                    <p:cond delay="0"/>
+                                  </p:stCondLst>
+                                  <p:childTnLst>
+                                    <p:set>
+                                      <p:cBhvr>
+                                        <p:cTn id="21" dur="1" fill="hold">
+                                          <p:stCondLst>
+                                            <p:cond delay="0"/>
+                                          </p:stCondLst>
+                                        </p:cTn>
+                                        <p:tgtEl>
+                                          <p:spTgt spid="2">
+                                            <p:txEl>
+                                              <p:pRg st="3" end="3"/>
+                                            </p:txEl>
+                                          </p:spTgt>
+                                        </p:tgtEl>
+                                        <p:attrNameLst>
+                                          <p:attrName>style.visibility</p:attrName>
+                                        </p:attrNameLst>
+                                      </p:cBhvr>
+                                      <p:to>
+                                        <p:strVal val="visible"/>
+                                      </p:to>
+                                    </p:set>
+                                    <p:animEffect transition="in" filter="fade">
+                                      <p:cBhvr>
+                                        <p:cTn id="22" dur="500"/>
+                                        <p:tgtEl>
+                                          <p:spTgt spid="2">
+                                            <p:txEl>
+                                              <p:pRg st="3" end="3"/>
+                                            </p:txEl>
+                                          </p:spTgt>
+                                        </p:tgtEl>
+                                      </p:cBhvr>
+                                    </p:animEffect>
+                                  </p:childTnLst>
+                                </p:cTn>
+                              </p:par>
+                            </p:childTnLst>
+                          </p:cTn>
+                        </p:par>
+                      </p:childTnLst>
+                    </p:cTn>
+                  </p:par>
+                  <p:par>
+                    <p:cTn id="23" fill="hold">
+                      <p:stCondLst>
+                        <p:cond delay="indefinite"/>
+                      </p:stCondLst>
+                      <p:childTnLst>
+                        <p:par>
+                          <p:cTn id="24" fill="hold">
+                            <p:stCondLst>
+                              <p:cond delay="0"/>
+                            </p:stCondLst>
+                            <p:childTnLst>
+                              <p:par>
+                                <p:cTn id="25" presetID="10" presetClass="entr" presetSubtype="0" fill="hold" grpId="0" nodeType="clickEffect">
+                                  <p:stCondLst>
+                                    <p:cond delay="0"/>
+                                  </p:stCondLst>
+                                  <p:childTnLst>
+                                    <p:set>
+                                      <p:cBhvr>
+                                        <p:cTn id="26" dur="1" fill="hold">
+                                          <p:stCondLst>
+                                            <p:cond delay="0"/>
+                                          </p:stCondLst>
+                                        </p:cTn>
+                                        <p:tgtEl>
+                                          <p:spTgt spid="2">
+                                            <p:txEl>
+                                              <p:pRg st="4" end="4"/>
+                                            </p:txEl>
+                                          </p:spTgt>
+                                        </p:tgtEl>
+                                        <p:attrNameLst>
+                                          <p:attrName>style.visibility</p:attrName>
+                                        </p:attrNameLst>
+                                      </p:cBhvr>
+                                      <p:to>
+                                        <p:strVal val="visible"/>
+                                      </p:to>
+                                    </p:set>
+                                    <p:animEffect transition="in" filter="fade">
+                                      <p:cBhvr>
+                                        <p:cTn id="27" dur="500"/>
+                                        <p:tgtEl>
+                                          <p:spTgt spid="2">
+                                            <p:txEl>
+                                              <p:pRg st="4" end="4"/>
+                                            </p:txEl>
+                                          </p:spTgt>
+                                        </p:tgtEl>
+                                      </p:cBhvr>
+                                    </p:animEffect>
+                                  </p:childTnLst>
+                                </p:cTn>
+                              </p:par>
+                            </p:childTnLst>
+                          </p:cTn>
+                        </p:par>
+                      </p:childTnLst>
+                    </p:cTn>
+                  </p:par>
+                  <p:par>
+                    <p:cTn id="28" fill="hold">
+                      <p:stCondLst>
+                        <p:cond delay="indefinite"/>
+                      </p:stCondLst>
+                      <p:childTnLst>
+                        <p:par>
+                          <p:cTn id="29" fill="hold">
+                            <p:stCondLst>
+                              <p:cond delay="0"/>
+                            </p:stCondLst>
+                            <p:childTnLst>
+                              <p:par>
+                                <p:cTn id="30" presetID="10" presetClass="entr" presetSubtype="0" fill="hold" grpId="0" nodeType="clickEffect">
+                                  <p:stCondLst>
+                                    <p:cond delay="0"/>
+                                  </p:stCondLst>
+                                  <p:childTnLst>
+                                    <p:set>
+                                      <p:cBhvr>
+                                        <p:cTn id="31" dur="1" fill="hold">
+                                          <p:stCondLst>
+                                            <p:cond delay="0"/>
+                                          </p:stCondLst>
+                                        </p:cTn>
+                                        <p:tgtEl>
+                                          <p:spTgt spid="2">
+                                            <p:txEl>
+                                              <p:pRg st="5" end="5"/>
+                                            </p:txEl>
+                                          </p:spTgt>
+                                        </p:tgtEl>
+                                        <p:attrNameLst>
+                                          <p:attrName>style.visibility</p:attrName>
+                                        </p:attrNameLst>
+                                      </p:cBhvr>
+                                      <p:to>
+                                        <p:strVal val="visible"/>
+                                      </p:to>
+                                    </p:set>
+                                    <p:animEffect transition="in" filter="fade">
+                                      <p:cBhvr>
+                                        <p:cTn id="32" dur="500"/>
+                                        <p:tgtEl>
+                                          <p:spTgt spid="2">
+                                            <p:txEl>
+                                              <p:pRg st="5" end="5"/>
+                                            </p:txEl>
+                                          </p:spTgt>
+                                        </p:tgtEl>
+                                      </p:cBhvr>
+                                    </p:animEffect>
+                                  </p:childTnLst>
+                                </p:cTn>
+                              </p:par>
+                            </p:childTnLst>
+                          </p:cTn>
+                        </p:par>
+                      </p:childTnLst>
+                    </p:cTn>
+                  </p:par>
+                </p:childTnLst>
+              </p:cTn>
+              <p:prevCondLst>
+                <p:cond evt="onPrev" delay="0">
+                  <p:tgtEl>
+                    <p:sldTgt/>
+                  </p:tgtEl>
+                </p:cond>
+              </p:prevCondLst>
+              <p:nextCondLst>
+                <p:cond evt="onNext" delay="0">
+                  <p:tgtEl>
+                    <p:sldTgt/>
+                  </p:tgtEl>
+                </p:cond>
+              </p:nextCondLst>
+            </p:seq>
+          </p:childTnLst>
+        </p:cTn>
+      </p:par>
+    </p:tnLst>
+    <p:bldLst>
+      <p:bldP spid="2" grpId="0" build="p"/>
+    </p:bldLst>
+  </p:timing>
 </p:sld>
 </file>
 
@@ -5256,7 +7290,7 @@
           <a:p>
             <a:r>
               <a:rPr lang="en-CA" dirty="0"/>
-              <a:t>Data</a:t>
+              <a:t>1. Grey seal data</a:t>
             </a:r>
             <a:endParaRPr lang="en-US" dirty="0"/>
           </a:p>
@@ -5297,7 +7331,7 @@
           <p:cNvPr id="2" name="Content Placeholder 1">
             <a:extLst>
               <a:ext uri="{FF2B5EF4-FFF2-40B4-BE49-F238E27FC236}">
-                <a16:creationId xmlns:a16="http://schemas.microsoft.com/office/drawing/2014/main" id="{4FFF32C6-03B9-45AE-9006-B19C69A59B6E}"/>
+                <a16:creationId xmlns:a16="http://schemas.microsoft.com/office/drawing/2014/main" id="{EC8489D7-F512-40C5-87F1-DE10D154B2D8}"/>
               </a:ext>
             </a:extLst>
           </p:cNvPr>
@@ -5308,86 +7342,181 @@
             <p:ph idx="1"/>
           </p:nvPr>
         </p:nvSpPr>
-        <p:spPr/>
-        <p:txBody>
-          <a:bodyPr/>
+        <p:spPr>
+          <a:xfrm>
+            <a:off x="623947" y="1431144"/>
+            <a:ext cx="10944109" cy="5089972"/>
+          </a:xfrm>
+        </p:spPr>
+        <p:txBody>
+          <a:bodyPr>
+            <a:normAutofit lnSpcReduction="10000"/>
+          </a:bodyPr>
           <a:lstStyle/>
           <a:p>
             <a:r>
-              <a:rPr lang="en-US" dirty="0" err="1"/>
+              <a:rPr lang="en-CA" dirty="0"/>
+              <a:t>Package by Brett McClintock and </a:t>
+            </a:r>
+            <a:r>
+              <a:rPr lang="en-CA" dirty="0" err="1"/>
+              <a:t>Théo</a:t>
+            </a:r>
+            <a:r>
+              <a:rPr lang="en-CA" dirty="0"/>
+              <a:t> </a:t>
+            </a:r>
+            <a:r>
+              <a:rPr lang="en-CA" dirty="0" err="1"/>
+              <a:t>Michelot</a:t>
+            </a:r>
+            <a:r>
+              <a:rPr lang="en-CA" dirty="0"/>
+              <a:t>, based on </a:t>
+            </a:r>
+            <a:r>
+              <a:rPr lang="en-US" dirty="0" err="1">
+                <a:solidFill>
+                  <a:schemeClr val="bg2">
+                    <a:lumMod val="10000"/>
+                  </a:schemeClr>
+                </a:solidFill>
+                <a:latin typeface="Lucida Console" panose="020B0609040504020204" pitchFamily="49" charset="0"/>
+                <a:cs typeface="Courier New" panose="02070309020205020404" pitchFamily="49" charset="0"/>
+              </a:rPr>
+              <a:t>moveHMM</a:t>
+            </a:r>
+            <a:endParaRPr lang="en-US" dirty="0">
+              <a:solidFill>
+                <a:schemeClr val="bg2">
+                  <a:lumMod val="10000"/>
+                </a:schemeClr>
+              </a:solidFill>
+              <a:latin typeface="Lucida Console" panose="020B0609040504020204" pitchFamily="49" charset="0"/>
+              <a:cs typeface="Courier New" panose="02070309020205020404" pitchFamily="49" charset="0"/>
+            </a:endParaRPr>
+          </a:p>
+          <a:p>
+            <a:r>
+              <a:rPr lang="en-CA" dirty="0">
+                <a:cs typeface="Courier New" panose="02070309020205020404" pitchFamily="49" charset="0"/>
+              </a:rPr>
+              <a:t>Key functions </a:t>
+            </a:r>
+          </a:p>
+          <a:p>
+            <a:pPr lvl="1"/>
+            <a:r>
+              <a:rPr lang="en-CA" spc="-133" dirty="0" err="1">
+                <a:solidFill>
+                  <a:schemeClr val="bg2">
+                    <a:lumMod val="10000"/>
+                  </a:schemeClr>
+                </a:solidFill>
+                <a:latin typeface="Lucida Console" panose="020B0609040504020204" pitchFamily="49" charset="0"/>
+                <a:cs typeface="Courier New" panose="02070309020205020404" pitchFamily="49" charset="0"/>
+              </a:rPr>
               <a:t>prepData</a:t>
             </a:r>
             <a:r>
-              <a:rPr lang="en-US" dirty="0"/>
-              <a:t>(</a:t>
-            </a:r>
-            <a:r>
-              <a:rPr lang="en-US" dirty="0" err="1"/>
-              <a:t>sealreg</a:t>
-            </a:r>
-            <a:r>
-              <a:rPr lang="en-US" dirty="0"/>
-              <a:t>, type = "LL", </a:t>
-            </a:r>
-            <a:r>
-              <a:rPr lang="en-US" dirty="0" err="1"/>
-              <a:t>coordNames</a:t>
-            </a:r>
-            <a:r>
-              <a:rPr lang="en-US" dirty="0"/>
-              <a:t> = c("</a:t>
-            </a:r>
-            <a:r>
-              <a:rPr lang="en-US" dirty="0" err="1"/>
-              <a:t>lon</a:t>
-            </a:r>
-            <a:r>
-              <a:rPr lang="en-US" dirty="0"/>
-              <a:t>", "</a:t>
-            </a:r>
-            <a:r>
-              <a:rPr lang="en-US" dirty="0" err="1"/>
-              <a:t>lat</a:t>
-            </a:r>
-            <a:r>
-              <a:rPr lang="en-US" dirty="0"/>
-              <a:t>"))</a:t>
-            </a:r>
-          </a:p>
-          <a:p>
-            <a:r>
-              <a:rPr lang="en-CA" dirty="0"/>
-              <a:t>T</a:t>
-            </a:r>
-            <a:r>
-              <a:rPr lang="en-US" dirty="0" err="1"/>
-              <a:t>ype</a:t>
-            </a:r>
-            <a:r>
-              <a:rPr lang="en-US" dirty="0"/>
-              <a:t>: coordinate reference system (</a:t>
-            </a:r>
-            <a:r>
-              <a:rPr lang="en-US" dirty="0" err="1"/>
-              <a:t>lat</a:t>
-            </a:r>
-            <a:r>
-              <a:rPr lang="en-US" dirty="0"/>
-              <a:t>/long or projected in m)</a:t>
-            </a:r>
-          </a:p>
-          <a:p>
-            <a:r>
-              <a:rPr lang="en-US" dirty="0" err="1"/>
-              <a:t>coordNames</a:t>
-            </a:r>
-            <a:r>
-              <a:rPr lang="en-US" dirty="0"/>
-              <a:t>: names of coordinate columns</a:t>
-            </a:r>
-          </a:p>
-          <a:p>
-            <a:endParaRPr lang="en-US" dirty="0"/>
+              <a:rPr lang="en-CA" dirty="0">
+                <a:cs typeface="Courier New" panose="02070309020205020404" pitchFamily="49" charset="0"/>
+              </a:rPr>
+              <a:t> – prepare tracking data for fitting HMM</a:t>
+            </a:r>
+          </a:p>
+          <a:p>
+            <a:pPr lvl="2"/>
+            <a:r>
+              <a:rPr lang="en-CA" dirty="0">
+                <a:cs typeface="Courier New" panose="02070309020205020404" pitchFamily="49" charset="0"/>
+              </a:rPr>
+              <a:t>Extract environmental data</a:t>
+            </a:r>
+          </a:p>
+          <a:p>
+            <a:pPr lvl="2"/>
+            <a:r>
+              <a:rPr lang="en-CA" dirty="0">
+                <a:cs typeface="Courier New" panose="02070309020205020404" pitchFamily="49" charset="0"/>
+              </a:rPr>
+              <a:t>Calculate step length and turning angle</a:t>
+            </a:r>
+          </a:p>
+          <a:p>
+            <a:pPr lvl="2"/>
+            <a:r>
+              <a:rPr lang="en-CA" dirty="0">
+                <a:cs typeface="Courier New" panose="02070309020205020404" pitchFamily="49" charset="0"/>
+              </a:rPr>
+              <a:t>Calculate circular covariates (e.g., angle relative to ocean currents)</a:t>
+            </a:r>
+          </a:p>
+          <a:p>
+            <a:pPr lvl="1"/>
+            <a:r>
+              <a:rPr lang="en-US" sz="2800" spc="-133" dirty="0" err="1">
+                <a:solidFill>
+                  <a:schemeClr val="bg2">
+                    <a:lumMod val="10000"/>
+                  </a:schemeClr>
+                </a:solidFill>
+                <a:latin typeface="Lucida Console" panose="020B0609040504020204" pitchFamily="49" charset="0"/>
+                <a:cs typeface="Courier New" panose="02070309020205020404" pitchFamily="49" charset="0"/>
+              </a:rPr>
+              <a:t>fitHMM</a:t>
+            </a:r>
+            <a:r>
+              <a:rPr lang="en-CA" dirty="0">
+                <a:cs typeface="Courier New" panose="02070309020205020404" pitchFamily="49" charset="0"/>
+              </a:rPr>
+              <a:t> – </a:t>
+            </a:r>
+            <a:r>
+              <a:rPr lang="en-US" dirty="0">
+                <a:cs typeface="Courier New" panose="02070309020205020404" pitchFamily="49" charset="0"/>
+              </a:rPr>
+              <a:t>Define HMM structure and fit it to model</a:t>
+            </a:r>
+          </a:p>
+          <a:p>
+            <a:pPr lvl="2"/>
+            <a:r>
+              <a:rPr lang="en-CA" dirty="0">
+                <a:cs typeface="Courier New" panose="02070309020205020404" pitchFamily="49" charset="0"/>
+              </a:rPr>
+              <a:t>Number of states</a:t>
+            </a:r>
+          </a:p>
+          <a:p>
+            <a:pPr lvl="2"/>
+            <a:r>
+              <a:rPr lang="en-CA" dirty="0">
+                <a:cs typeface="Courier New" panose="02070309020205020404" pitchFamily="49" charset="0"/>
+              </a:rPr>
+              <a:t>Distribution associated with each state </a:t>
+            </a:r>
+          </a:p>
+          <a:p>
+            <a:pPr lvl="2"/>
+            <a:r>
+              <a:rPr lang="en-CA" dirty="0">
+                <a:cs typeface="Courier New" panose="02070309020205020404" pitchFamily="49" charset="0"/>
+              </a:rPr>
+              <a:t>Starting parameters </a:t>
+            </a:r>
+          </a:p>
+          <a:p>
+            <a:pPr lvl="2"/>
+            <a:r>
+              <a:rPr lang="en-CA" dirty="0">
+                <a:cs typeface="Courier New" panose="02070309020205020404" pitchFamily="49" charset="0"/>
+              </a:rPr>
+              <a:t>Covariates</a:t>
+            </a:r>
+            <a:endParaRPr lang="en-US" dirty="0">
+              <a:cs typeface="Courier New" panose="02070309020205020404" pitchFamily="49" charset="0"/>
+            </a:endParaRPr>
           </a:p>
         </p:txBody>
       </p:sp>
@@ -5396,7 +7525,7 @@
           <p:cNvPr id="3" name="Slide Number Placeholder 2">
             <a:extLst>
               <a:ext uri="{FF2B5EF4-FFF2-40B4-BE49-F238E27FC236}">
-                <a16:creationId xmlns:a16="http://schemas.microsoft.com/office/drawing/2014/main" id="{FB82CA19-DDF8-4679-8F6B-C6019D4941CE}"/>
+                <a16:creationId xmlns:a16="http://schemas.microsoft.com/office/drawing/2014/main" id="{C652FC54-3760-4749-A720-9D60BB2068DA}"/>
               </a:ext>
             </a:extLst>
           </p:cNvPr>
@@ -5426,7 +7555,7 @@
           <p:cNvPr id="4" name="Title 3">
             <a:extLst>
               <a:ext uri="{FF2B5EF4-FFF2-40B4-BE49-F238E27FC236}">
-                <a16:creationId xmlns:a16="http://schemas.microsoft.com/office/drawing/2014/main" id="{6A30EBB8-01EB-4A75-993E-FD32E3FF45E4}"/>
+                <a16:creationId xmlns:a16="http://schemas.microsoft.com/office/drawing/2014/main" id="{16B592B6-27DA-462D-863F-E06EDBEFB08D}"/>
               </a:ext>
             </a:extLst>
           </p:cNvPr>
@@ -5443,25 +7572,576 @@
           <a:lstStyle/>
           <a:p>
             <a:r>
-              <a:rPr lang="en-CA" dirty="0" err="1">
+              <a:rPr lang="en-CA" dirty="0">
                 <a:cs typeface="Courier New" panose="02070309020205020404" pitchFamily="49" charset="0"/>
               </a:rPr>
-              <a:t>prepData</a:t>
-            </a:r>
-            <a:endParaRPr lang="en-US" dirty="0"/>
+              <a:t>2. Fitting HMM with </a:t>
+            </a:r>
+            <a:r>
+              <a:rPr lang="en-CA" dirty="0" err="1">
+                <a:latin typeface="Lucida Console" panose="020B0609040504020204" pitchFamily="49" charset="0"/>
+                <a:cs typeface="Courier New" panose="02070309020205020404" pitchFamily="49" charset="0"/>
+              </a:rPr>
+              <a:t>momentuHMM</a:t>
+            </a:r>
+            <a:endParaRPr lang="en-US" dirty="0">
+              <a:latin typeface="Lucida Console" panose="020B0609040504020204" pitchFamily="49" charset="0"/>
+            </a:endParaRPr>
           </a:p>
         </p:txBody>
       </p:sp>
     </p:spTree>
     <p:extLst>
       <p:ext uri="{BB962C8B-B14F-4D97-AF65-F5344CB8AC3E}">
-        <p14:creationId xmlns:p14="http://schemas.microsoft.com/office/powerpoint/2010/main" val="2925305773"/>
+        <p14:creationId xmlns:p14="http://schemas.microsoft.com/office/powerpoint/2010/main" val="1034678634"/>
       </p:ext>
     </p:extLst>
   </p:cSld>
   <p:clrMapOvr>
     <a:masterClrMapping/>
   </p:clrMapOvr>
+  <p:timing>
+    <p:tnLst>
+      <p:par>
+        <p:cTn id="1" dur="indefinite" restart="never" nodeType="tmRoot">
+          <p:childTnLst>
+            <p:seq concurrent="1" nextAc="seek">
+              <p:cTn id="2" dur="indefinite" nodeType="mainSeq">
+                <p:childTnLst>
+                  <p:par>
+                    <p:cTn id="3" fill="hold">
+                      <p:stCondLst>
+                        <p:cond delay="indefinite"/>
+                      </p:stCondLst>
+                      <p:childTnLst>
+                        <p:par>
+                          <p:cTn id="4" fill="hold">
+                            <p:stCondLst>
+                              <p:cond delay="0"/>
+                            </p:stCondLst>
+                            <p:childTnLst>
+                              <p:par>
+                                <p:cTn id="5" presetID="10" presetClass="entr" presetSubtype="0" fill="hold" grpId="0" nodeType="clickEffect">
+                                  <p:stCondLst>
+                                    <p:cond delay="0"/>
+                                  </p:stCondLst>
+                                  <p:childTnLst>
+                                    <p:set>
+                                      <p:cBhvr>
+                                        <p:cTn id="6" dur="1" fill="hold">
+                                          <p:stCondLst>
+                                            <p:cond delay="0"/>
+                                          </p:stCondLst>
+                                        </p:cTn>
+                                        <p:tgtEl>
+                                          <p:spTgt spid="2">
+                                            <p:txEl>
+                                              <p:pRg st="0" end="0"/>
+                                            </p:txEl>
+                                          </p:spTgt>
+                                        </p:tgtEl>
+                                        <p:attrNameLst>
+                                          <p:attrName>style.visibility</p:attrName>
+                                        </p:attrNameLst>
+                                      </p:cBhvr>
+                                      <p:to>
+                                        <p:strVal val="visible"/>
+                                      </p:to>
+                                    </p:set>
+                                    <p:animEffect transition="in" filter="fade">
+                                      <p:cBhvr>
+                                        <p:cTn id="7" dur="500"/>
+                                        <p:tgtEl>
+                                          <p:spTgt spid="2">
+                                            <p:txEl>
+                                              <p:pRg st="0" end="0"/>
+                                            </p:txEl>
+                                          </p:spTgt>
+                                        </p:tgtEl>
+                                      </p:cBhvr>
+                                    </p:animEffect>
+                                  </p:childTnLst>
+                                </p:cTn>
+                              </p:par>
+                            </p:childTnLst>
+                          </p:cTn>
+                        </p:par>
+                      </p:childTnLst>
+                    </p:cTn>
+                  </p:par>
+                  <p:par>
+                    <p:cTn id="8" fill="hold">
+                      <p:stCondLst>
+                        <p:cond delay="indefinite"/>
+                      </p:stCondLst>
+                      <p:childTnLst>
+                        <p:par>
+                          <p:cTn id="9" fill="hold">
+                            <p:stCondLst>
+                              <p:cond delay="0"/>
+                            </p:stCondLst>
+                            <p:childTnLst>
+                              <p:par>
+                                <p:cTn id="10" presetID="10" presetClass="entr" presetSubtype="0" fill="hold" grpId="0" nodeType="clickEffect">
+                                  <p:stCondLst>
+                                    <p:cond delay="0"/>
+                                  </p:stCondLst>
+                                  <p:childTnLst>
+                                    <p:set>
+                                      <p:cBhvr>
+                                        <p:cTn id="11" dur="1" fill="hold">
+                                          <p:stCondLst>
+                                            <p:cond delay="0"/>
+                                          </p:stCondLst>
+                                        </p:cTn>
+                                        <p:tgtEl>
+                                          <p:spTgt spid="2">
+                                            <p:txEl>
+                                              <p:pRg st="1" end="1"/>
+                                            </p:txEl>
+                                          </p:spTgt>
+                                        </p:tgtEl>
+                                        <p:attrNameLst>
+                                          <p:attrName>style.visibility</p:attrName>
+                                        </p:attrNameLst>
+                                      </p:cBhvr>
+                                      <p:to>
+                                        <p:strVal val="visible"/>
+                                      </p:to>
+                                    </p:set>
+                                    <p:animEffect transition="in" filter="fade">
+                                      <p:cBhvr>
+                                        <p:cTn id="12" dur="500"/>
+                                        <p:tgtEl>
+                                          <p:spTgt spid="2">
+                                            <p:txEl>
+                                              <p:pRg st="1" end="1"/>
+                                            </p:txEl>
+                                          </p:spTgt>
+                                        </p:tgtEl>
+                                      </p:cBhvr>
+                                    </p:animEffect>
+                                  </p:childTnLst>
+                                </p:cTn>
+                              </p:par>
+                              <p:par>
+                                <p:cTn id="13" presetID="10" presetClass="entr" presetSubtype="0" fill="hold" grpId="0" nodeType="withEffect">
+                                  <p:stCondLst>
+                                    <p:cond delay="0"/>
+                                  </p:stCondLst>
+                                  <p:childTnLst>
+                                    <p:set>
+                                      <p:cBhvr>
+                                        <p:cTn id="14" dur="1" fill="hold">
+                                          <p:stCondLst>
+                                            <p:cond delay="0"/>
+                                          </p:stCondLst>
+                                        </p:cTn>
+                                        <p:tgtEl>
+                                          <p:spTgt spid="2">
+                                            <p:txEl>
+                                              <p:pRg st="2" end="2"/>
+                                            </p:txEl>
+                                          </p:spTgt>
+                                        </p:tgtEl>
+                                        <p:attrNameLst>
+                                          <p:attrName>style.visibility</p:attrName>
+                                        </p:attrNameLst>
+                                      </p:cBhvr>
+                                      <p:to>
+                                        <p:strVal val="visible"/>
+                                      </p:to>
+                                    </p:set>
+                                    <p:animEffect transition="in" filter="fade">
+                                      <p:cBhvr>
+                                        <p:cTn id="15" dur="500"/>
+                                        <p:tgtEl>
+                                          <p:spTgt spid="2">
+                                            <p:txEl>
+                                              <p:pRg st="2" end="2"/>
+                                            </p:txEl>
+                                          </p:spTgt>
+                                        </p:tgtEl>
+                                      </p:cBhvr>
+                                    </p:animEffect>
+                                  </p:childTnLst>
+                                </p:cTn>
+                              </p:par>
+                              <p:par>
+                                <p:cTn id="16" presetID="10" presetClass="entr" presetSubtype="0" fill="hold" grpId="0" nodeType="withEffect">
+                                  <p:stCondLst>
+                                    <p:cond delay="0"/>
+                                  </p:stCondLst>
+                                  <p:childTnLst>
+                                    <p:set>
+                                      <p:cBhvr>
+                                        <p:cTn id="17" dur="1" fill="hold">
+                                          <p:stCondLst>
+                                            <p:cond delay="0"/>
+                                          </p:stCondLst>
+                                        </p:cTn>
+                                        <p:tgtEl>
+                                          <p:spTgt spid="2">
+                                            <p:txEl>
+                                              <p:pRg st="3" end="3"/>
+                                            </p:txEl>
+                                          </p:spTgt>
+                                        </p:tgtEl>
+                                        <p:attrNameLst>
+                                          <p:attrName>style.visibility</p:attrName>
+                                        </p:attrNameLst>
+                                      </p:cBhvr>
+                                      <p:to>
+                                        <p:strVal val="visible"/>
+                                      </p:to>
+                                    </p:set>
+                                    <p:animEffect transition="in" filter="fade">
+                                      <p:cBhvr>
+                                        <p:cTn id="18" dur="500"/>
+                                        <p:tgtEl>
+                                          <p:spTgt spid="2">
+                                            <p:txEl>
+                                              <p:pRg st="3" end="3"/>
+                                            </p:txEl>
+                                          </p:spTgt>
+                                        </p:tgtEl>
+                                      </p:cBhvr>
+                                    </p:animEffect>
+                                  </p:childTnLst>
+                                </p:cTn>
+                              </p:par>
+                              <p:par>
+                                <p:cTn id="19" presetID="10" presetClass="entr" presetSubtype="0" fill="hold" grpId="0" nodeType="withEffect">
+                                  <p:stCondLst>
+                                    <p:cond delay="0"/>
+                                  </p:stCondLst>
+                                  <p:childTnLst>
+                                    <p:set>
+                                      <p:cBhvr>
+                                        <p:cTn id="20" dur="1" fill="hold">
+                                          <p:stCondLst>
+                                            <p:cond delay="0"/>
+                                          </p:stCondLst>
+                                        </p:cTn>
+                                        <p:tgtEl>
+                                          <p:spTgt spid="2">
+                                            <p:txEl>
+                                              <p:pRg st="4" end="4"/>
+                                            </p:txEl>
+                                          </p:spTgt>
+                                        </p:tgtEl>
+                                        <p:attrNameLst>
+                                          <p:attrName>style.visibility</p:attrName>
+                                        </p:attrNameLst>
+                                      </p:cBhvr>
+                                      <p:to>
+                                        <p:strVal val="visible"/>
+                                      </p:to>
+                                    </p:set>
+                                    <p:animEffect transition="in" filter="fade">
+                                      <p:cBhvr>
+                                        <p:cTn id="21" dur="500"/>
+                                        <p:tgtEl>
+                                          <p:spTgt spid="2">
+                                            <p:txEl>
+                                              <p:pRg st="4" end="4"/>
+                                            </p:txEl>
+                                          </p:spTgt>
+                                        </p:tgtEl>
+                                      </p:cBhvr>
+                                    </p:animEffect>
+                                  </p:childTnLst>
+                                </p:cTn>
+                              </p:par>
+                              <p:par>
+                                <p:cTn id="22" presetID="10" presetClass="entr" presetSubtype="0" fill="hold" grpId="0" nodeType="withEffect">
+                                  <p:stCondLst>
+                                    <p:cond delay="0"/>
+                                  </p:stCondLst>
+                                  <p:childTnLst>
+                                    <p:set>
+                                      <p:cBhvr>
+                                        <p:cTn id="23" dur="1" fill="hold">
+                                          <p:stCondLst>
+                                            <p:cond delay="0"/>
+                                          </p:stCondLst>
+                                        </p:cTn>
+                                        <p:tgtEl>
+                                          <p:spTgt spid="2">
+                                            <p:txEl>
+                                              <p:pRg st="5" end="5"/>
+                                            </p:txEl>
+                                          </p:spTgt>
+                                        </p:tgtEl>
+                                        <p:attrNameLst>
+                                          <p:attrName>style.visibility</p:attrName>
+                                        </p:attrNameLst>
+                                      </p:cBhvr>
+                                      <p:to>
+                                        <p:strVal val="visible"/>
+                                      </p:to>
+                                    </p:set>
+                                    <p:animEffect transition="in" filter="fade">
+                                      <p:cBhvr>
+                                        <p:cTn id="24" dur="500"/>
+                                        <p:tgtEl>
+                                          <p:spTgt spid="2">
+                                            <p:txEl>
+                                              <p:pRg st="5" end="5"/>
+                                            </p:txEl>
+                                          </p:spTgt>
+                                        </p:tgtEl>
+                                      </p:cBhvr>
+                                    </p:animEffect>
+                                  </p:childTnLst>
+                                </p:cTn>
+                              </p:par>
+                              <p:par>
+                                <p:cTn id="25" presetID="10" presetClass="entr" presetSubtype="0" fill="hold" grpId="0" nodeType="withEffect">
+                                  <p:stCondLst>
+                                    <p:cond delay="0"/>
+                                  </p:stCondLst>
+                                  <p:childTnLst>
+                                    <p:set>
+                                      <p:cBhvr>
+                                        <p:cTn id="26" dur="1" fill="hold">
+                                          <p:stCondLst>
+                                            <p:cond delay="0"/>
+                                          </p:stCondLst>
+                                        </p:cTn>
+                                        <p:tgtEl>
+                                          <p:spTgt spid="2">
+                                            <p:txEl>
+                                              <p:pRg st="6" end="6"/>
+                                            </p:txEl>
+                                          </p:spTgt>
+                                        </p:tgtEl>
+                                        <p:attrNameLst>
+                                          <p:attrName>style.visibility</p:attrName>
+                                        </p:attrNameLst>
+                                      </p:cBhvr>
+                                      <p:to>
+                                        <p:strVal val="visible"/>
+                                      </p:to>
+                                    </p:set>
+                                    <p:animEffect transition="in" filter="fade">
+                                      <p:cBhvr>
+                                        <p:cTn id="27" dur="500"/>
+                                        <p:tgtEl>
+                                          <p:spTgt spid="2">
+                                            <p:txEl>
+                                              <p:pRg st="6" end="6"/>
+                                            </p:txEl>
+                                          </p:spTgt>
+                                        </p:tgtEl>
+                                      </p:cBhvr>
+                                    </p:animEffect>
+                                  </p:childTnLst>
+                                </p:cTn>
+                              </p:par>
+                              <p:par>
+                                <p:cTn id="28" presetID="10" presetClass="entr" presetSubtype="0" fill="hold" grpId="0" nodeType="withEffect">
+                                  <p:stCondLst>
+                                    <p:cond delay="0"/>
+                                  </p:stCondLst>
+                                  <p:childTnLst>
+                                    <p:set>
+                                      <p:cBhvr>
+                                        <p:cTn id="29" dur="1" fill="hold">
+                                          <p:stCondLst>
+                                            <p:cond delay="0"/>
+                                          </p:stCondLst>
+                                        </p:cTn>
+                                        <p:tgtEl>
+                                          <p:spTgt spid="2">
+                                            <p:txEl>
+                                              <p:pRg st="7" end="7"/>
+                                            </p:txEl>
+                                          </p:spTgt>
+                                        </p:tgtEl>
+                                        <p:attrNameLst>
+                                          <p:attrName>style.visibility</p:attrName>
+                                        </p:attrNameLst>
+                                      </p:cBhvr>
+                                      <p:to>
+                                        <p:strVal val="visible"/>
+                                      </p:to>
+                                    </p:set>
+                                    <p:animEffect transition="in" filter="fade">
+                                      <p:cBhvr>
+                                        <p:cTn id="30" dur="500"/>
+                                        <p:tgtEl>
+                                          <p:spTgt spid="2">
+                                            <p:txEl>
+                                              <p:pRg st="7" end="7"/>
+                                            </p:txEl>
+                                          </p:spTgt>
+                                        </p:tgtEl>
+                                      </p:cBhvr>
+                                    </p:animEffect>
+                                  </p:childTnLst>
+                                </p:cTn>
+                              </p:par>
+                              <p:par>
+                                <p:cTn id="31" presetID="10" presetClass="entr" presetSubtype="0" fill="hold" grpId="0" nodeType="withEffect">
+                                  <p:stCondLst>
+                                    <p:cond delay="0"/>
+                                  </p:stCondLst>
+                                  <p:childTnLst>
+                                    <p:set>
+                                      <p:cBhvr>
+                                        <p:cTn id="32" dur="1" fill="hold">
+                                          <p:stCondLst>
+                                            <p:cond delay="0"/>
+                                          </p:stCondLst>
+                                        </p:cTn>
+                                        <p:tgtEl>
+                                          <p:spTgt spid="2">
+                                            <p:txEl>
+                                              <p:pRg st="8" end="8"/>
+                                            </p:txEl>
+                                          </p:spTgt>
+                                        </p:tgtEl>
+                                        <p:attrNameLst>
+                                          <p:attrName>style.visibility</p:attrName>
+                                        </p:attrNameLst>
+                                      </p:cBhvr>
+                                      <p:to>
+                                        <p:strVal val="visible"/>
+                                      </p:to>
+                                    </p:set>
+                                    <p:animEffect transition="in" filter="fade">
+                                      <p:cBhvr>
+                                        <p:cTn id="33" dur="500"/>
+                                        <p:tgtEl>
+                                          <p:spTgt spid="2">
+                                            <p:txEl>
+                                              <p:pRg st="8" end="8"/>
+                                            </p:txEl>
+                                          </p:spTgt>
+                                        </p:tgtEl>
+                                      </p:cBhvr>
+                                    </p:animEffect>
+                                  </p:childTnLst>
+                                </p:cTn>
+                              </p:par>
+                              <p:par>
+                                <p:cTn id="34" presetID="10" presetClass="entr" presetSubtype="0" fill="hold" grpId="0" nodeType="withEffect">
+                                  <p:stCondLst>
+                                    <p:cond delay="0"/>
+                                  </p:stCondLst>
+                                  <p:childTnLst>
+                                    <p:set>
+                                      <p:cBhvr>
+                                        <p:cTn id="35" dur="1" fill="hold">
+                                          <p:stCondLst>
+                                            <p:cond delay="0"/>
+                                          </p:stCondLst>
+                                        </p:cTn>
+                                        <p:tgtEl>
+                                          <p:spTgt spid="2">
+                                            <p:txEl>
+                                              <p:pRg st="9" end="9"/>
+                                            </p:txEl>
+                                          </p:spTgt>
+                                        </p:tgtEl>
+                                        <p:attrNameLst>
+                                          <p:attrName>style.visibility</p:attrName>
+                                        </p:attrNameLst>
+                                      </p:cBhvr>
+                                      <p:to>
+                                        <p:strVal val="visible"/>
+                                      </p:to>
+                                    </p:set>
+                                    <p:animEffect transition="in" filter="fade">
+                                      <p:cBhvr>
+                                        <p:cTn id="36" dur="500"/>
+                                        <p:tgtEl>
+                                          <p:spTgt spid="2">
+                                            <p:txEl>
+                                              <p:pRg st="9" end="9"/>
+                                            </p:txEl>
+                                          </p:spTgt>
+                                        </p:tgtEl>
+                                      </p:cBhvr>
+                                    </p:animEffect>
+                                  </p:childTnLst>
+                                </p:cTn>
+                              </p:par>
+                              <p:par>
+                                <p:cTn id="37" presetID="10" presetClass="entr" presetSubtype="0" fill="hold" grpId="0" nodeType="withEffect">
+                                  <p:stCondLst>
+                                    <p:cond delay="0"/>
+                                  </p:stCondLst>
+                                  <p:childTnLst>
+                                    <p:set>
+                                      <p:cBhvr>
+                                        <p:cTn id="38" dur="1" fill="hold">
+                                          <p:stCondLst>
+                                            <p:cond delay="0"/>
+                                          </p:stCondLst>
+                                        </p:cTn>
+                                        <p:tgtEl>
+                                          <p:spTgt spid="2">
+                                            <p:txEl>
+                                              <p:pRg st="10" end="10"/>
+                                            </p:txEl>
+                                          </p:spTgt>
+                                        </p:tgtEl>
+                                        <p:attrNameLst>
+                                          <p:attrName>style.visibility</p:attrName>
+                                        </p:attrNameLst>
+                                      </p:cBhvr>
+                                      <p:to>
+                                        <p:strVal val="visible"/>
+                                      </p:to>
+                                    </p:set>
+                                    <p:animEffect transition="in" filter="fade">
+                                      <p:cBhvr>
+                                        <p:cTn id="39" dur="500"/>
+                                        <p:tgtEl>
+                                          <p:spTgt spid="2">
+                                            <p:txEl>
+                                              <p:pRg st="10" end="10"/>
+                                            </p:txEl>
+                                          </p:spTgt>
+                                        </p:tgtEl>
+                                      </p:cBhvr>
+                                    </p:animEffect>
+                                  </p:childTnLst>
+                                </p:cTn>
+                              </p:par>
+                            </p:childTnLst>
+                          </p:cTn>
+                        </p:par>
+                      </p:childTnLst>
+                    </p:cTn>
+                  </p:par>
+                </p:childTnLst>
+              </p:cTn>
+              <p:prevCondLst>
+                <p:cond evt="onPrev" delay="0">
+                  <p:tgtEl>
+                    <p:sldTgt/>
+                  </p:tgtEl>
+                </p:cond>
+              </p:prevCondLst>
+              <p:nextCondLst>
+                <p:cond evt="onNext" delay="0">
+                  <p:tgtEl>
+                    <p:sldTgt/>
+                  </p:tgtEl>
+                </p:cond>
+              </p:nextCondLst>
+            </p:seq>
+          </p:childTnLst>
+        </p:cTn>
+      </p:par>
+    </p:tnLst>
+    <p:bldLst>
+      <p:bldP spid="2" grpId="0" uiExpand="1" build="p"/>
+    </p:bldLst>
+  </p:timing>
 </p:sld>
 </file>
 
@@ -5487,7 +8167,7 @@
           <p:cNvPr id="2" name="Content Placeholder 1">
             <a:extLst>
               <a:ext uri="{FF2B5EF4-FFF2-40B4-BE49-F238E27FC236}">
-                <a16:creationId xmlns:a16="http://schemas.microsoft.com/office/drawing/2014/main" id="{8158A7E8-673A-4442-950A-3B7B01FD0ADF}"/>
+                <a16:creationId xmlns:a16="http://schemas.microsoft.com/office/drawing/2014/main" id="{4FFF32C6-03B9-45AE-9006-B19C69A59B6E}"/>
               </a:ext>
             </a:extLst>
           </p:cNvPr>
@@ -5503,154 +8183,218 @@
           <a:bodyPr/>
           <a:lstStyle/>
           <a:p>
+            <a:pPr marL="0" indent="0">
+              <a:buNone/>
+            </a:pPr>
+            <a:r>
+              <a:rPr lang="en-CA" dirty="0"/>
+              <a:t>Minimum arguments:</a:t>
+            </a:r>
+            <a:endParaRPr lang="en-US" dirty="0"/>
+          </a:p>
+          <a:p>
+            <a:pPr lvl="1"/>
+            <a:r>
+              <a:rPr lang="en-CA" dirty="0">
+                <a:solidFill>
+                  <a:schemeClr val="bg2">
+                    <a:lumMod val="10000"/>
+                  </a:schemeClr>
+                </a:solidFill>
+                <a:latin typeface="Lucida Console" panose="020B0609040504020204" pitchFamily="49" charset="0"/>
+                <a:cs typeface="Courier New" panose="02070309020205020404" pitchFamily="49" charset="0"/>
+              </a:rPr>
+              <a:t>Data</a:t>
+            </a:r>
+            <a:r>
+              <a:rPr lang="en-CA" dirty="0"/>
+              <a:t> (e.g., </a:t>
+            </a:r>
+            <a:r>
+              <a:rPr lang="en-US" dirty="0">
+                <a:solidFill>
+                  <a:schemeClr val="bg2">
+                    <a:lumMod val="10000"/>
+                  </a:schemeClr>
+                </a:solidFill>
+                <a:latin typeface="Lucida Console" panose="020B0609040504020204" pitchFamily="49" charset="0"/>
+                <a:cs typeface="Courier New" panose="02070309020205020404" pitchFamily="49" charset="0"/>
+              </a:rPr>
+              <a:t>data = </a:t>
+            </a:r>
+            <a:r>
+              <a:rPr lang="en-US" dirty="0" err="1">
+                <a:solidFill>
+                  <a:schemeClr val="bg2">
+                    <a:lumMod val="10000"/>
+                  </a:schemeClr>
+                </a:solidFill>
+                <a:latin typeface="Lucida Console" panose="020B0609040504020204" pitchFamily="49" charset="0"/>
+                <a:cs typeface="Courier New" panose="02070309020205020404" pitchFamily="49" charset="0"/>
+              </a:rPr>
+              <a:t>sealreg</a:t>
+            </a:r>
+            <a:r>
+              <a:rPr lang="en-US" dirty="0"/>
+              <a:t>)</a:t>
+            </a:r>
+            <a:endParaRPr lang="en-CA" dirty="0"/>
+          </a:p>
+          <a:p>
+            <a:pPr lvl="1"/>
+            <a:r>
+              <a:rPr lang="en-CA" dirty="0">
+                <a:solidFill>
+                  <a:schemeClr val="bg2">
+                    <a:lumMod val="10000"/>
+                  </a:schemeClr>
+                </a:solidFill>
+                <a:latin typeface="Lucida Console" panose="020B0609040504020204" pitchFamily="49" charset="0"/>
+                <a:cs typeface="Courier New" panose="02070309020205020404" pitchFamily="49" charset="0"/>
+              </a:rPr>
+              <a:t>T</a:t>
+            </a:r>
+            <a:r>
+              <a:rPr lang="en-US" dirty="0" err="1">
+                <a:solidFill>
+                  <a:schemeClr val="bg2">
+                    <a:lumMod val="10000"/>
+                  </a:schemeClr>
+                </a:solidFill>
+                <a:latin typeface="Lucida Console" panose="020B0609040504020204" pitchFamily="49" charset="0"/>
+                <a:cs typeface="Courier New" panose="02070309020205020404" pitchFamily="49" charset="0"/>
+              </a:rPr>
+              <a:t>ype</a:t>
+            </a:r>
+            <a:r>
+              <a:rPr lang="en-US" dirty="0"/>
+              <a:t> - coordinate reference system (</a:t>
+            </a:r>
+            <a:r>
+              <a:rPr lang="en-US" dirty="0">
+                <a:solidFill>
+                  <a:schemeClr val="bg2">
+                    <a:lumMod val="10000"/>
+                  </a:schemeClr>
+                </a:solidFill>
+                <a:latin typeface="Lucida Console" panose="020B0609040504020204" pitchFamily="49" charset="0"/>
+                <a:cs typeface="Courier New" panose="02070309020205020404" pitchFamily="49" charset="0"/>
+              </a:rPr>
+              <a:t>“UTM”</a:t>
+            </a:r>
+            <a:r>
+              <a:rPr lang="en-US" dirty="0"/>
+              <a:t> if not </a:t>
+            </a:r>
             <a:r>
               <a:rPr lang="en-US" dirty="0" err="1"/>
-              <a:t>nbState</a:t>
+              <a:t>lat</a:t>
             </a:r>
             <a:r>
               <a:rPr lang="en-US" dirty="0"/>
-              <a:t>: number of </a:t>
-            </a:r>
-            <a:r>
-              <a:rPr lang="en-US" dirty="0" err="1"/>
-              <a:t>behavioural</a:t>
+              <a:t>/long)</a:t>
+            </a:r>
+          </a:p>
+          <a:p>
+            <a:pPr lvl="1"/>
+            <a:r>
+              <a:rPr lang="en-US" dirty="0" err="1">
+                <a:solidFill>
+                  <a:schemeClr val="bg2">
+                    <a:lumMod val="10000"/>
+                  </a:schemeClr>
+                </a:solidFill>
+                <a:latin typeface="Lucida Console" panose="020B0609040504020204" pitchFamily="49" charset="0"/>
+                <a:cs typeface="Courier New" panose="02070309020205020404" pitchFamily="49" charset="0"/>
+              </a:rPr>
+              <a:t>coordNames</a:t>
             </a:r>
             <a:r>
               <a:rPr lang="en-US" dirty="0"/>
-              <a:t> states</a:t>
-            </a:r>
-          </a:p>
-          <a:p>
-            <a:r>
-              <a:rPr lang="en-US" dirty="0" err="1"/>
-              <a:t>dist</a:t>
+              <a:t> - names of coordinate columns (if not </a:t>
+            </a:r>
+            <a:r>
+              <a:rPr lang="en-US" dirty="0">
+                <a:solidFill>
+                  <a:schemeClr val="bg2">
+                    <a:lumMod val="10000"/>
+                  </a:schemeClr>
+                </a:solidFill>
+                <a:latin typeface="Lucida Console" panose="020B0609040504020204" pitchFamily="49" charset="0"/>
+                <a:cs typeface="Courier New" panose="02070309020205020404" pitchFamily="49" charset="0"/>
+              </a:rPr>
+              <a:t>c(“x”, “y”)</a:t>
             </a:r>
             <a:r>
               <a:rPr lang="en-US" dirty="0"/>
-              <a:t>: </a:t>
-            </a:r>
+              <a:t>)</a:t>
+            </a:r>
+          </a:p>
+          <a:p>
+            <a:pPr marL="0" indent="0">
+              <a:buNone/>
+            </a:pPr>
             <a:r>
               <a:rPr lang="en-CA" dirty="0"/>
-              <a:t>named list </a:t>
+              <a:t>Optional arguments:</a:t>
+            </a:r>
+          </a:p>
+          <a:p>
+            <a:pPr lvl="1"/>
+            <a:r>
+              <a:rPr lang="en-US" dirty="0" err="1">
+                <a:solidFill>
+                  <a:schemeClr val="bg2">
+                    <a:lumMod val="10000"/>
+                  </a:schemeClr>
+                </a:solidFill>
+                <a:latin typeface="Lucida Console" panose="020B0609040504020204" pitchFamily="49" charset="0"/>
+                <a:cs typeface="Courier New" panose="02070309020205020404" pitchFamily="49" charset="0"/>
+              </a:rPr>
+              <a:t>covNames</a:t>
             </a:r>
             <a:r>
               <a:rPr lang="en-US" dirty="0"/>
-              <a:t>distribution associated with each data stream</a:t>
+              <a:t> – names of covariates (fills in missing data with nearest value)</a:t>
             </a:r>
           </a:p>
           <a:p>
             <a:pPr lvl="1"/>
             <a:r>
-              <a:rPr lang="en-CA" dirty="0"/>
-              <a:t>E</a:t>
+              <a:rPr lang="en-US" dirty="0" err="1">
+                <a:solidFill>
+                  <a:schemeClr val="bg2">
+                    <a:lumMod val="10000"/>
+                  </a:schemeClr>
+                </a:solidFill>
+                <a:latin typeface="Lucida Console" panose="020B0609040504020204" pitchFamily="49" charset="0"/>
+                <a:cs typeface="Courier New" panose="02070309020205020404" pitchFamily="49" charset="0"/>
+              </a:rPr>
+              <a:t>spatialCovs</a:t>
             </a:r>
             <a:r>
               <a:rPr lang="en-US" dirty="0"/>
-              <a:t>.g., gamma for step length and von Mises for turning angle</a:t>
+              <a:t> – raster object from which to extract covariate data</a:t>
             </a:r>
           </a:p>
           <a:p>
             <a:pPr lvl="1"/>
             <a:r>
-              <a:rPr lang="en-CA" dirty="0"/>
-              <a:t>E.</a:t>
+              <a:rPr lang="en-US" dirty="0" err="1">
+                <a:solidFill>
+                  <a:schemeClr val="bg2">
+                    <a:lumMod val="10000"/>
+                  </a:schemeClr>
+                </a:solidFill>
+                <a:latin typeface="Lucida Console" panose="020B0609040504020204" pitchFamily="49" charset="0"/>
+                <a:cs typeface="Courier New" panose="02070309020205020404" pitchFamily="49" charset="0"/>
+              </a:rPr>
+              <a:t>angleCovs</a:t>
             </a:r>
             <a:r>
               <a:rPr lang="en-US" dirty="0"/>
-              <a:t>g., </a:t>
-            </a:r>
-            <a:r>
-              <a:rPr lang="en-US" dirty="0" err="1"/>
-              <a:t>dist</a:t>
-            </a:r>
-            <a:r>
-              <a:rPr lang="en-US" dirty="0"/>
-              <a:t>=list(step="gamma", angle="</a:t>
-            </a:r>
-            <a:r>
-              <a:rPr lang="en-US" dirty="0" err="1"/>
-              <a:t>vm</a:t>
-            </a:r>
-            <a:r>
-              <a:rPr lang="en-US" dirty="0"/>
-              <a:t>")</a:t>
-            </a:r>
-          </a:p>
-          <a:p>
-            <a:r>
-              <a:rPr lang="en-CA" dirty="0"/>
-              <a:t>Par0: named list initial parameters for data optimisation</a:t>
-            </a:r>
-          </a:p>
-          <a:p>
-            <a:pPr lvl="1"/>
-            <a:r>
-              <a:rPr lang="en-CA" dirty="0"/>
-              <a:t>E.g., step length ~ gamma(</a:t>
-            </a:r>
-            <a:r>
-              <a:rPr lang="el-GR" dirty="0"/>
-              <a:t>μ</a:t>
-            </a:r>
-            <a:r>
-              <a:rPr lang="en-CA" baseline="-25000" dirty="0" err="1"/>
-              <a:t>i</a:t>
-            </a:r>
-            <a:r>
-              <a:rPr lang="en-CA" dirty="0"/>
-              <a:t>,</a:t>
-            </a:r>
-            <a:r>
-              <a:rPr lang="el-GR" dirty="0"/>
-              <a:t>σ</a:t>
-            </a:r>
-            <a:r>
-              <a:rPr lang="en-CA" baseline="-25000" dirty="0" err="1"/>
-              <a:t>i</a:t>
-            </a:r>
-            <a:r>
-              <a:rPr lang="en-CA" dirty="0"/>
-              <a:t>) , define </a:t>
-            </a:r>
-            <a:r>
-              <a:rPr lang="el-GR" dirty="0"/>
-              <a:t>μ</a:t>
-            </a:r>
-            <a:r>
-              <a:rPr lang="en-CA" dirty="0"/>
-              <a:t> and </a:t>
-            </a:r>
-            <a:r>
-              <a:rPr lang="el-GR" dirty="0"/>
-              <a:t>σ</a:t>
-            </a:r>
-            <a:r>
-              <a:rPr lang="en-CA" dirty="0"/>
-              <a:t> for each state</a:t>
-            </a:r>
-          </a:p>
-          <a:p>
-            <a:pPr lvl="1"/>
-            <a:r>
-              <a:rPr lang="en-CA" dirty="0"/>
-              <a:t>Par0 = list(step=c(mu0, sigma0), angle=kappa0)</a:t>
-            </a:r>
-          </a:p>
-          <a:p>
-            <a:r>
-              <a:rPr lang="en-CA" dirty="0"/>
-              <a:t>Formula: effects of covariates on the transition probability</a:t>
-            </a:r>
-          </a:p>
-          <a:p>
-            <a:pPr lvl="1"/>
-            <a:r>
-              <a:rPr lang="en-CA" dirty="0"/>
-              <a:t>E.g., formula= ~bathy</a:t>
-            </a:r>
-          </a:p>
-          <a:p>
-            <a:endParaRPr lang="en-CA" dirty="0"/>
+              <a:t> – name of angular covariate for which to calculate the relative angle (e.g., turn angle relative to wind</a:t>
+            </a:r>
           </a:p>
         </p:txBody>
       </p:sp>
@@ -5659,7 +8403,7 @@
           <p:cNvPr id="3" name="Slide Number Placeholder 2">
             <a:extLst>
               <a:ext uri="{FF2B5EF4-FFF2-40B4-BE49-F238E27FC236}">
-                <a16:creationId xmlns:a16="http://schemas.microsoft.com/office/drawing/2014/main" id="{4CB58DD9-7462-4F66-B011-DAC7CF9A358D}"/>
+                <a16:creationId xmlns:a16="http://schemas.microsoft.com/office/drawing/2014/main" id="{FB82CA19-DDF8-4679-8F6B-C6019D4941CE}"/>
               </a:ext>
             </a:extLst>
           </p:cNvPr>
@@ -5689,7 +8433,7 @@
           <p:cNvPr id="4" name="Title 3">
             <a:extLst>
               <a:ext uri="{FF2B5EF4-FFF2-40B4-BE49-F238E27FC236}">
-                <a16:creationId xmlns:a16="http://schemas.microsoft.com/office/drawing/2014/main" id="{D59B0DCA-D1B0-4D44-8C96-53954CF5FE58}"/>
+                <a16:creationId xmlns:a16="http://schemas.microsoft.com/office/drawing/2014/main" id="{6A30EBB8-01EB-4A75-993E-FD32E3FF45E4}"/>
               </a:ext>
             </a:extLst>
           </p:cNvPr>
@@ -5706,19 +8450,60 @@
           <a:lstStyle/>
           <a:p>
             <a:r>
-              <a:rPr lang="en-US" dirty="0" err="1">
-                <a:cs typeface="Courier New" panose="02070309020205020404" pitchFamily="49" charset="0"/>
+              <a:rPr lang="en-US" sz="2400" dirty="0" err="1">
+                <a:latin typeface="Lucida Console" panose="020B0609040504020204" pitchFamily="49" charset="0"/>
               </a:rPr>
-              <a:t>fitHMM</a:t>
-            </a:r>
-            <a:endParaRPr lang="en-US" dirty="0"/>
+              <a:t>prepData</a:t>
+            </a:r>
+            <a:r>
+              <a:rPr lang="en-US" sz="2400" dirty="0">
+                <a:latin typeface="Lucida Console" panose="020B0609040504020204" pitchFamily="49" charset="0"/>
+              </a:rPr>
+              <a:t>(data, type = "LL", </a:t>
+            </a:r>
+            <a:r>
+              <a:rPr lang="en-US" sz="2400" dirty="0" err="1">
+                <a:latin typeface="Lucida Console" panose="020B0609040504020204" pitchFamily="49" charset="0"/>
+              </a:rPr>
+              <a:t>coordNames</a:t>
+            </a:r>
+            <a:r>
+              <a:rPr lang="en-US" sz="2400" dirty="0">
+                <a:latin typeface="Lucida Console" panose="020B0609040504020204" pitchFamily="49" charset="0"/>
+              </a:rPr>
+              <a:t> = c("</a:t>
+            </a:r>
+            <a:r>
+              <a:rPr lang="en-US" sz="2400" dirty="0" err="1">
+                <a:latin typeface="Lucida Console" panose="020B0609040504020204" pitchFamily="49" charset="0"/>
+              </a:rPr>
+              <a:t>lon</a:t>
+            </a:r>
+            <a:r>
+              <a:rPr lang="en-US" sz="2400" dirty="0">
+                <a:latin typeface="Lucida Console" panose="020B0609040504020204" pitchFamily="49" charset="0"/>
+              </a:rPr>
+              <a:t>", "</a:t>
+            </a:r>
+            <a:r>
+              <a:rPr lang="en-US" sz="2400" dirty="0" err="1">
+                <a:latin typeface="Lucida Console" panose="020B0609040504020204" pitchFamily="49" charset="0"/>
+              </a:rPr>
+              <a:t>lat</a:t>
+            </a:r>
+            <a:r>
+              <a:rPr lang="en-US" sz="2400" dirty="0">
+                <a:latin typeface="Lucida Console" panose="020B0609040504020204" pitchFamily="49" charset="0"/>
+              </a:rPr>
+              <a:t>"))</a:t>
+            </a:r>
           </a:p>
         </p:txBody>
       </p:sp>
     </p:spTree>
     <p:extLst>
       <p:ext uri="{BB962C8B-B14F-4D97-AF65-F5344CB8AC3E}">
-        <p14:creationId xmlns:p14="http://schemas.microsoft.com/office/powerpoint/2010/main" val="2920903825"/>
+        <p14:creationId xmlns:p14="http://schemas.microsoft.com/office/powerpoint/2010/main" val="1623288044"/>
       </p:ext>
     </p:extLst>
   </p:cSld>

</xml_diff>